<commit_message>
incorporación diapositiva 3 y 4
</commit_message>
<xml_diff>
--- a/Presentaciones/Intro Arduino - 2024 - 3.pptx
+++ b/Presentaciones/Intro Arduino - 2024 - 3.pptx
@@ -5,7 +5,7 @@
     <p:sldMasterId id="2147483660" r:id="rId1"/>
   </p:sldMasterIdLst>
   <p:notesMasterIdLst>
-    <p:notesMasterId r:id="rId22"/>
+    <p:notesMasterId r:id="rId24"/>
   </p:notesMasterIdLst>
   <p:sldIdLst>
     <p:sldId id="300" r:id="rId2"/>
@@ -26,8 +26,10 @@
     <p:sldId id="356" r:id="rId17"/>
     <p:sldId id="357" r:id="rId18"/>
     <p:sldId id="358" r:id="rId19"/>
-    <p:sldId id="359" r:id="rId20"/>
-    <p:sldId id="360" r:id="rId21"/>
+    <p:sldId id="362" r:id="rId20"/>
+    <p:sldId id="361" r:id="rId21"/>
+    <p:sldId id="359" r:id="rId22"/>
+    <p:sldId id="360" r:id="rId23"/>
   </p:sldIdLst>
   <p:sldSz cx="9144000" cy="6858000" type="screen4x3"/>
   <p:notesSz cx="6858000" cy="9144000"/>
@@ -227,7 +229,7 @@
           <a:p>
             <a:fld id="{B45D0D80-3F5A-4E2B-8189-1BE0B88D707F}" type="datetimeFigureOut">
               <a:rPr lang="es-ES" smtClean="0"/>
-              <a:t>03/12/2024</a:t>
+              <a:t>09/12/2024</a:t>
             </a:fld>
             <a:endParaRPr lang="es-ES"/>
           </a:p>
@@ -631,7 +633,7 @@
             <a:fld id="{7A847CFC-816F-41D0-AAC0-9BF4FEBC753E}" type="datetimeFigureOut">
               <a:rPr lang="es-ES" smtClean="0"/>
               <a:pPr/>
-              <a:t>03/12/2024</a:t>
+              <a:t>09/12/2024</a:t>
             </a:fld>
             <a:endParaRPr lang="es-ES"/>
           </a:p>
@@ -875,7 +877,7 @@
             <a:fld id="{7A847CFC-816F-41D0-AAC0-9BF4FEBC753E}" type="datetimeFigureOut">
               <a:rPr lang="es-ES" smtClean="0"/>
               <a:pPr/>
-              <a:t>03/12/2024</a:t>
+              <a:t>09/12/2024</a:t>
             </a:fld>
             <a:endParaRPr lang="es-ES"/>
           </a:p>
@@ -1061,7 +1063,7 @@
             <a:fld id="{7A847CFC-816F-41D0-AAC0-9BF4FEBC753E}" type="datetimeFigureOut">
               <a:rPr lang="es-ES" smtClean="0"/>
               <a:pPr/>
-              <a:t>03/12/2024</a:t>
+              <a:t>09/12/2024</a:t>
             </a:fld>
             <a:endParaRPr lang="es-ES"/>
           </a:p>
@@ -1264,7 +1266,7 @@
             <a:fld id="{7A847CFC-816F-41D0-AAC0-9BF4FEBC753E}" type="datetimeFigureOut">
               <a:rPr lang="es-ES" smtClean="0"/>
               <a:pPr/>
-              <a:t>03/12/2024</a:t>
+              <a:t>09/12/2024</a:t>
             </a:fld>
             <a:endParaRPr lang="es-ES"/>
           </a:p>
@@ -1545,7 +1547,7 @@
             <a:fld id="{7A847CFC-816F-41D0-AAC0-9BF4FEBC753E}" type="datetimeFigureOut">
               <a:rPr lang="es-ES" smtClean="0"/>
               <a:pPr/>
-              <a:t>03/12/2024</a:t>
+              <a:t>09/12/2024</a:t>
             </a:fld>
             <a:endParaRPr lang="es-ES"/>
           </a:p>
@@ -1815,7 +1817,7 @@
             <a:fld id="{7A847CFC-816F-41D0-AAC0-9BF4FEBC753E}" type="datetimeFigureOut">
               <a:rPr lang="es-ES" smtClean="0"/>
               <a:pPr/>
-              <a:t>03/12/2024</a:t>
+              <a:t>09/12/2024</a:t>
             </a:fld>
             <a:endParaRPr lang="es-ES"/>
           </a:p>
@@ -2264,7 +2266,7 @@
             <a:fld id="{7A847CFC-816F-41D0-AAC0-9BF4FEBC753E}" type="datetimeFigureOut">
               <a:rPr lang="es-ES" smtClean="0"/>
               <a:pPr/>
-              <a:t>03/12/2024</a:t>
+              <a:t>09/12/2024</a:t>
             </a:fld>
             <a:endParaRPr lang="es-ES"/>
           </a:p>
@@ -2415,7 +2417,7 @@
             <a:fld id="{7A847CFC-816F-41D0-AAC0-9BF4FEBC753E}" type="datetimeFigureOut">
               <a:rPr lang="es-ES" smtClean="0"/>
               <a:pPr/>
-              <a:t>03/12/2024</a:t>
+              <a:t>09/12/2024</a:t>
             </a:fld>
             <a:endParaRPr lang="es-ES"/>
           </a:p>
@@ -2512,7 +2514,7 @@
             <a:fld id="{7A847CFC-816F-41D0-AAC0-9BF4FEBC753E}" type="datetimeFigureOut">
               <a:rPr lang="es-ES" smtClean="0"/>
               <a:pPr/>
-              <a:t>03/12/2024</a:t>
+              <a:t>09/12/2024</a:t>
             </a:fld>
             <a:endParaRPr lang="es-ES"/>
           </a:p>
@@ -2767,7 +2769,7 @@
             <a:fld id="{7A847CFC-816F-41D0-AAC0-9BF4FEBC753E}" type="datetimeFigureOut">
               <a:rPr lang="es-ES" smtClean="0"/>
               <a:pPr/>
-              <a:t>03/12/2024</a:t>
+              <a:t>09/12/2024</a:t>
             </a:fld>
             <a:endParaRPr lang="es-ES"/>
           </a:p>
@@ -3214,7 +3216,7 @@
             <a:fld id="{7A847CFC-816F-41D0-AAC0-9BF4FEBC753E}" type="datetimeFigureOut">
               <a:rPr lang="es-ES" smtClean="0"/>
               <a:pPr/>
-              <a:t>03/12/2024</a:t>
+              <a:t>09/12/2024</a:t>
             </a:fld>
             <a:endParaRPr lang="es-ES"/>
           </a:p>
@@ -3580,7 +3582,7 @@
             <a:fld id="{7A847CFC-816F-41D0-AAC0-9BF4FEBC753E}" type="datetimeFigureOut">
               <a:rPr lang="es-ES" smtClean="0"/>
               <a:pPr/>
-              <a:t>03/12/2024</a:t>
+              <a:t>09/12/2024</a:t>
             </a:fld>
             <a:endParaRPr lang="es-ES"/>
           </a:p>
@@ -13979,7 +13981,7 @@
         <p:cNvPr id="1" name="">
           <a:extLst>
             <a:ext uri="{FF2B5EF4-FFF2-40B4-BE49-F238E27FC236}">
-              <a16:creationId xmlns:a16="http://schemas.microsoft.com/office/drawing/2014/main" id="{9884729A-8056-8ED0-A043-E20B4CB169EF}"/>
+              <a16:creationId xmlns:a16="http://schemas.microsoft.com/office/drawing/2014/main" id="{FC2B787E-9E5E-E43B-28B7-1BBAA6A8A8D8}"/>
             </a:ext>
           </a:extLst>
         </p:cNvPr>
@@ -13999,7 +14001,7 @@
           <p:cNvPr id="2" name="Título 1">
             <a:extLst>
               <a:ext uri="{FF2B5EF4-FFF2-40B4-BE49-F238E27FC236}">
-                <a16:creationId xmlns:a16="http://schemas.microsoft.com/office/drawing/2014/main" id="{B2436B42-099C-5AD2-141F-C3A00E107839}"/>
+                <a16:creationId xmlns:a16="http://schemas.microsoft.com/office/drawing/2014/main" id="{3E3C245D-71FF-8EA1-7F91-9B2591A59F5E}"/>
               </a:ext>
             </a:extLst>
           </p:cNvPr>
@@ -14012,7 +14014,7 @@
         </p:nvSpPr>
         <p:spPr>
           <a:xfrm>
-            <a:off x="539552" y="260648"/>
+            <a:off x="457199" y="260648"/>
             <a:ext cx="8229600" cy="1143000"/>
           </a:xfrm>
         </p:spPr>
@@ -14025,1059 +14027,45 @@
             <a:pPr algn="ctr"/>
             <a:r>
               <a:rPr lang="es-ES" sz="4400" dirty="0"/>
-              <a:t>Objeto </a:t>
-            </a:r>
-            <a:r>
-              <a:rPr lang="es-ES" sz="4400" dirty="0" err="1"/>
-              <a:t>string</a:t>
-            </a:r>
-            <a:endParaRPr lang="es-ES" sz="4400" dirty="0"/>
+              <a:t>Ejemplo Objeto serial</a:t>
+            </a:r>
           </a:p>
         </p:txBody>
       </p:sp>
-      <p:sp>
-        <p:nvSpPr>
-          <p:cNvPr id="7" name="CuadroTexto 6">
+      <p:pic>
+        <p:nvPicPr>
+          <p:cNvPr id="4" name="Imagen 3">
             <a:extLst>
               <a:ext uri="{FF2B5EF4-FFF2-40B4-BE49-F238E27FC236}">
-                <a16:creationId xmlns:a16="http://schemas.microsoft.com/office/drawing/2014/main" id="{760F4F46-5905-A279-E871-2560392E3421}"/>
+                <a16:creationId xmlns:a16="http://schemas.microsoft.com/office/drawing/2014/main" id="{6D696ECE-B2D3-D697-EDF3-C200C168DA7F}"/>
               </a:ext>
             </a:extLst>
           </p:cNvPr>
-          <p:cNvSpPr txBox="1"/>
+          <p:cNvPicPr>
+            <a:picLocks noChangeAspect="1"/>
+          </p:cNvPicPr>
           <p:nvPr/>
-        </p:nvSpPr>
+        </p:nvPicPr>
+        <p:blipFill>
+          <a:blip r:embed="rId2"/>
+          <a:stretch>
+            <a:fillRect/>
+          </a:stretch>
+        </p:blipFill>
         <p:spPr>
           <a:xfrm>
-            <a:off x="539552" y="1052736"/>
-            <a:ext cx="8064896" cy="3332066"/>
+            <a:off x="447099" y="1714260"/>
+            <a:ext cx="8249801" cy="3429479"/>
           </a:xfrm>
           <a:prstGeom prst="rect">
             <a:avLst/>
           </a:prstGeom>
-          <a:noFill/>
         </p:spPr>
-        <p:txBody>
-          <a:bodyPr wrap="square">
-            <a:spAutoFit/>
-          </a:bodyPr>
-          <a:lstStyle/>
-          <a:p>
-            <a:pPr>
-              <a:lnSpc>
-                <a:spcPts val="3225"/>
-              </a:lnSpc>
-            </a:pPr>
-            <a:r>
-              <a:rPr lang="es-ES" b="0" dirty="0" err="1">
-                <a:solidFill>
-                  <a:srgbClr val="4E5B61"/>
-                </a:solidFill>
-                <a:effectLst/>
-                <a:latin typeface="Consolas" panose="020B0609020204030204" pitchFamily="49" charset="0"/>
-              </a:rPr>
-              <a:t>String</a:t>
-            </a:r>
-            <a:r>
-              <a:rPr lang="es-ES" b="0" dirty="0">
-                <a:solidFill>
-                  <a:srgbClr val="4E5B61"/>
-                </a:solidFill>
-                <a:effectLst/>
-                <a:latin typeface="Consolas" panose="020B0609020204030204" pitchFamily="49" charset="0"/>
-              </a:rPr>
-              <a:t> </a:t>
-            </a:r>
-            <a:r>
-              <a:rPr lang="es-ES" b="0" dirty="0" err="1">
-                <a:solidFill>
-                  <a:srgbClr val="4E5B61"/>
-                </a:solidFill>
-                <a:effectLst/>
-                <a:latin typeface="Consolas" panose="020B0609020204030204" pitchFamily="49" charset="0"/>
-              </a:rPr>
-              <a:t>stringOne</a:t>
-            </a:r>
-            <a:r>
-              <a:rPr lang="es-ES" b="0" dirty="0">
-                <a:solidFill>
-                  <a:srgbClr val="4E5B61"/>
-                </a:solidFill>
-                <a:effectLst/>
-                <a:latin typeface="Consolas" panose="020B0609020204030204" pitchFamily="49" charset="0"/>
-              </a:rPr>
-              <a:t> = </a:t>
-            </a:r>
-            <a:r>
-              <a:rPr lang="es-ES" b="0" dirty="0">
-                <a:solidFill>
-                  <a:srgbClr val="005C5F"/>
-                </a:solidFill>
-                <a:effectLst/>
-                <a:latin typeface="Consolas" panose="020B0609020204030204" pitchFamily="49" charset="0"/>
-              </a:rPr>
-              <a:t>"</a:t>
-            </a:r>
-            <a:r>
-              <a:rPr lang="es-ES" b="0" dirty="0" err="1">
-                <a:solidFill>
-                  <a:srgbClr val="005C5F"/>
-                </a:solidFill>
-                <a:effectLst/>
-                <a:latin typeface="Consolas" panose="020B0609020204030204" pitchFamily="49" charset="0"/>
-              </a:rPr>
-              <a:t>Hello</a:t>
-            </a:r>
-            <a:r>
-              <a:rPr lang="es-ES" b="0" dirty="0">
-                <a:solidFill>
-                  <a:srgbClr val="005C5F"/>
-                </a:solidFill>
-                <a:effectLst/>
-                <a:latin typeface="Consolas" panose="020B0609020204030204" pitchFamily="49" charset="0"/>
-              </a:rPr>
-              <a:t> </a:t>
-            </a:r>
-            <a:r>
-              <a:rPr lang="es-ES" b="0" dirty="0" err="1">
-                <a:solidFill>
-                  <a:srgbClr val="005C5F"/>
-                </a:solidFill>
-                <a:effectLst/>
-                <a:latin typeface="Consolas" panose="020B0609020204030204" pitchFamily="49" charset="0"/>
-              </a:rPr>
-              <a:t>String</a:t>
-            </a:r>
-            <a:r>
-              <a:rPr lang="es-ES" b="0" dirty="0">
-                <a:solidFill>
-                  <a:srgbClr val="005C5F"/>
-                </a:solidFill>
-                <a:effectLst/>
-                <a:latin typeface="Consolas" panose="020B0609020204030204" pitchFamily="49" charset="0"/>
-              </a:rPr>
-              <a:t>"</a:t>
-            </a:r>
-            <a:r>
-              <a:rPr lang="es-ES" b="0" dirty="0">
-                <a:solidFill>
-                  <a:srgbClr val="4E5B61"/>
-                </a:solidFill>
-                <a:effectLst/>
-                <a:latin typeface="Consolas" panose="020B0609020204030204" pitchFamily="49" charset="0"/>
-              </a:rPr>
-              <a:t>;</a:t>
-            </a:r>
-            <a:r>
-              <a:rPr lang="es-ES" b="0" dirty="0">
-                <a:solidFill>
-                  <a:srgbClr val="95A5A6"/>
-                </a:solidFill>
-                <a:effectLst/>
-                <a:latin typeface="Consolas" panose="020B0609020204030204" pitchFamily="49" charset="0"/>
-              </a:rPr>
-              <a:t> </a:t>
-            </a:r>
-          </a:p>
-          <a:p>
-            <a:pPr>
-              <a:lnSpc>
-                <a:spcPts val="3225"/>
-              </a:lnSpc>
-            </a:pPr>
-            <a:r>
-              <a:rPr lang="es-ES" b="0" dirty="0" err="1">
-                <a:solidFill>
-                  <a:srgbClr val="4E5B61"/>
-                </a:solidFill>
-                <a:effectLst/>
-                <a:latin typeface="Consolas" panose="020B0609020204030204" pitchFamily="49" charset="0"/>
-              </a:rPr>
-              <a:t>String</a:t>
-            </a:r>
-            <a:r>
-              <a:rPr lang="es-ES" b="0" dirty="0">
-                <a:solidFill>
-                  <a:srgbClr val="4E5B61"/>
-                </a:solidFill>
-                <a:effectLst/>
-                <a:latin typeface="Consolas" panose="020B0609020204030204" pitchFamily="49" charset="0"/>
-              </a:rPr>
-              <a:t> </a:t>
-            </a:r>
-            <a:r>
-              <a:rPr lang="es-ES" b="0" dirty="0" err="1">
-                <a:solidFill>
-                  <a:srgbClr val="4E5B61"/>
-                </a:solidFill>
-                <a:effectLst/>
-                <a:latin typeface="Consolas" panose="020B0609020204030204" pitchFamily="49" charset="0"/>
-              </a:rPr>
-              <a:t>stringOne</a:t>
-            </a:r>
-            <a:r>
-              <a:rPr lang="es-ES" b="0" dirty="0">
-                <a:solidFill>
-                  <a:srgbClr val="4E5B61"/>
-                </a:solidFill>
-                <a:effectLst/>
-                <a:latin typeface="Consolas" panose="020B0609020204030204" pitchFamily="49" charset="0"/>
-              </a:rPr>
-              <a:t> = </a:t>
-            </a:r>
-            <a:r>
-              <a:rPr lang="es-ES" b="0" dirty="0" err="1">
-                <a:solidFill>
-                  <a:srgbClr val="D35400"/>
-                </a:solidFill>
-                <a:effectLst/>
-                <a:latin typeface="Consolas" panose="020B0609020204030204" pitchFamily="49" charset="0"/>
-              </a:rPr>
-              <a:t>String</a:t>
-            </a:r>
-            <a:r>
-              <a:rPr lang="es-ES" b="0" dirty="0">
-                <a:solidFill>
-                  <a:srgbClr val="434F54"/>
-                </a:solidFill>
-                <a:effectLst/>
-                <a:latin typeface="Consolas" panose="020B0609020204030204" pitchFamily="49" charset="0"/>
-              </a:rPr>
-              <a:t>(</a:t>
-            </a:r>
-            <a:r>
-              <a:rPr lang="es-ES" b="0" dirty="0">
-                <a:solidFill>
-                  <a:srgbClr val="4E5B61"/>
-                </a:solidFill>
-                <a:effectLst/>
-                <a:latin typeface="Consolas" panose="020B0609020204030204" pitchFamily="49" charset="0"/>
-              </a:rPr>
-              <a:t>'a’</a:t>
-            </a:r>
-            <a:r>
-              <a:rPr lang="es-ES" b="0" dirty="0">
-                <a:solidFill>
-                  <a:srgbClr val="434F54"/>
-                </a:solidFill>
-                <a:effectLst/>
-                <a:latin typeface="Consolas" panose="020B0609020204030204" pitchFamily="49" charset="0"/>
-              </a:rPr>
-              <a:t>)</a:t>
-            </a:r>
-            <a:r>
-              <a:rPr lang="es-ES" b="0" dirty="0">
-                <a:solidFill>
-                  <a:srgbClr val="4E5B61"/>
-                </a:solidFill>
-                <a:effectLst/>
-                <a:latin typeface="Consolas" panose="020B0609020204030204" pitchFamily="49" charset="0"/>
-              </a:rPr>
-              <a:t>;</a:t>
-            </a:r>
-            <a:endParaRPr lang="es-ES" dirty="0">
-              <a:solidFill>
-                <a:srgbClr val="95A5A6"/>
-              </a:solidFill>
-              <a:latin typeface="Consolas" panose="020B0609020204030204" pitchFamily="49" charset="0"/>
-            </a:endParaRPr>
-          </a:p>
-          <a:p>
-            <a:pPr>
-              <a:lnSpc>
-                <a:spcPts val="3225"/>
-              </a:lnSpc>
-            </a:pPr>
-            <a:r>
-              <a:rPr lang="es-ES" b="0" dirty="0" err="1">
-                <a:solidFill>
-                  <a:srgbClr val="4E5B61"/>
-                </a:solidFill>
-                <a:effectLst/>
-                <a:latin typeface="Consolas" panose="020B0609020204030204" pitchFamily="49" charset="0"/>
-              </a:rPr>
-              <a:t>String</a:t>
-            </a:r>
-            <a:r>
-              <a:rPr lang="es-ES" b="0" dirty="0">
-                <a:solidFill>
-                  <a:srgbClr val="4E5B61"/>
-                </a:solidFill>
-                <a:effectLst/>
-                <a:latin typeface="Consolas" panose="020B0609020204030204" pitchFamily="49" charset="0"/>
-              </a:rPr>
-              <a:t> </a:t>
-            </a:r>
-            <a:r>
-              <a:rPr lang="es-ES" b="0" dirty="0" err="1">
-                <a:solidFill>
-                  <a:srgbClr val="4E5B61"/>
-                </a:solidFill>
-                <a:effectLst/>
-                <a:latin typeface="Consolas" panose="020B0609020204030204" pitchFamily="49" charset="0"/>
-              </a:rPr>
-              <a:t>stringTwo</a:t>
-            </a:r>
-            <a:r>
-              <a:rPr lang="es-ES" b="0" dirty="0">
-                <a:solidFill>
-                  <a:srgbClr val="4E5B61"/>
-                </a:solidFill>
-                <a:effectLst/>
-                <a:latin typeface="Consolas" panose="020B0609020204030204" pitchFamily="49" charset="0"/>
-              </a:rPr>
-              <a:t> = </a:t>
-            </a:r>
-            <a:r>
-              <a:rPr lang="es-ES" b="0" dirty="0" err="1">
-                <a:solidFill>
-                  <a:srgbClr val="D35400"/>
-                </a:solidFill>
-                <a:effectLst/>
-                <a:latin typeface="Consolas" panose="020B0609020204030204" pitchFamily="49" charset="0"/>
-              </a:rPr>
-              <a:t>String</a:t>
-            </a:r>
-            <a:r>
-              <a:rPr lang="es-ES" b="0" dirty="0">
-                <a:solidFill>
-                  <a:srgbClr val="434F54"/>
-                </a:solidFill>
-                <a:effectLst/>
-                <a:latin typeface="Consolas" panose="020B0609020204030204" pitchFamily="49" charset="0"/>
-              </a:rPr>
-              <a:t>(</a:t>
-            </a:r>
-            <a:r>
-              <a:rPr lang="es-ES" b="0" dirty="0">
-                <a:solidFill>
-                  <a:srgbClr val="005C5F"/>
-                </a:solidFill>
-                <a:effectLst/>
-                <a:latin typeface="Consolas" panose="020B0609020204030204" pitchFamily="49" charset="0"/>
-              </a:rPr>
-              <a:t>"</a:t>
-            </a:r>
-            <a:r>
-              <a:rPr lang="es-ES" b="0" dirty="0" err="1">
-                <a:solidFill>
-                  <a:srgbClr val="005C5F"/>
-                </a:solidFill>
-                <a:effectLst/>
-                <a:latin typeface="Consolas" panose="020B0609020204030204" pitchFamily="49" charset="0"/>
-              </a:rPr>
-              <a:t>This</a:t>
-            </a:r>
-            <a:r>
-              <a:rPr lang="es-ES" b="0" dirty="0">
-                <a:solidFill>
-                  <a:srgbClr val="005C5F"/>
-                </a:solidFill>
-                <a:effectLst/>
-                <a:latin typeface="Consolas" panose="020B0609020204030204" pitchFamily="49" charset="0"/>
-              </a:rPr>
-              <a:t> </a:t>
-            </a:r>
-            <a:r>
-              <a:rPr lang="es-ES" b="0" dirty="0" err="1">
-                <a:solidFill>
-                  <a:srgbClr val="005C5F"/>
-                </a:solidFill>
-                <a:effectLst/>
-                <a:latin typeface="Consolas" panose="020B0609020204030204" pitchFamily="49" charset="0"/>
-              </a:rPr>
-              <a:t>is</a:t>
-            </a:r>
-            <a:r>
-              <a:rPr lang="es-ES" b="0" dirty="0">
-                <a:solidFill>
-                  <a:srgbClr val="005C5F"/>
-                </a:solidFill>
-                <a:effectLst/>
-                <a:latin typeface="Consolas" panose="020B0609020204030204" pitchFamily="49" charset="0"/>
-              </a:rPr>
-              <a:t> a </a:t>
-            </a:r>
-            <a:r>
-              <a:rPr lang="es-ES" b="0" dirty="0" err="1">
-                <a:solidFill>
-                  <a:srgbClr val="005C5F"/>
-                </a:solidFill>
-                <a:effectLst/>
-                <a:latin typeface="Consolas" panose="020B0609020204030204" pitchFamily="49" charset="0"/>
-              </a:rPr>
-              <a:t>string</a:t>
-            </a:r>
-            <a:r>
-              <a:rPr lang="es-ES" b="0" dirty="0">
-                <a:solidFill>
-                  <a:srgbClr val="005C5F"/>
-                </a:solidFill>
-                <a:effectLst/>
-                <a:latin typeface="Consolas" panose="020B0609020204030204" pitchFamily="49" charset="0"/>
-              </a:rPr>
-              <a:t>"</a:t>
-            </a:r>
-            <a:r>
-              <a:rPr lang="es-ES" b="0" dirty="0">
-                <a:solidFill>
-                  <a:srgbClr val="434F54"/>
-                </a:solidFill>
-                <a:effectLst/>
-                <a:latin typeface="Consolas" panose="020B0609020204030204" pitchFamily="49" charset="0"/>
-              </a:rPr>
-              <a:t>)</a:t>
-            </a:r>
-            <a:r>
-              <a:rPr lang="es-ES" b="0" dirty="0">
-                <a:solidFill>
-                  <a:srgbClr val="4E5B61"/>
-                </a:solidFill>
-                <a:effectLst/>
-                <a:latin typeface="Consolas" panose="020B0609020204030204" pitchFamily="49" charset="0"/>
-              </a:rPr>
-              <a:t>;</a:t>
-            </a:r>
-          </a:p>
-          <a:p>
-            <a:pPr>
-              <a:lnSpc>
-                <a:spcPts val="3225"/>
-              </a:lnSpc>
-            </a:pPr>
-            <a:r>
-              <a:rPr lang="es-ES" b="0" dirty="0" err="1">
-                <a:solidFill>
-                  <a:srgbClr val="4E5B61"/>
-                </a:solidFill>
-                <a:effectLst/>
-                <a:latin typeface="Consolas" panose="020B0609020204030204" pitchFamily="49" charset="0"/>
-              </a:rPr>
-              <a:t>String</a:t>
-            </a:r>
-            <a:r>
-              <a:rPr lang="es-ES" b="0" dirty="0">
-                <a:solidFill>
-                  <a:srgbClr val="4E5B61"/>
-                </a:solidFill>
-                <a:effectLst/>
-                <a:latin typeface="Consolas" panose="020B0609020204030204" pitchFamily="49" charset="0"/>
-              </a:rPr>
-              <a:t> </a:t>
-            </a:r>
-            <a:r>
-              <a:rPr lang="es-ES" b="0" dirty="0" err="1">
-                <a:solidFill>
-                  <a:srgbClr val="4E5B61"/>
-                </a:solidFill>
-                <a:effectLst/>
-                <a:latin typeface="Consolas" panose="020B0609020204030204" pitchFamily="49" charset="0"/>
-              </a:rPr>
-              <a:t>stringOne</a:t>
-            </a:r>
-            <a:r>
-              <a:rPr lang="es-ES" b="0" dirty="0">
-                <a:solidFill>
-                  <a:srgbClr val="4E5B61"/>
-                </a:solidFill>
-                <a:effectLst/>
-                <a:latin typeface="Consolas" panose="020B0609020204030204" pitchFamily="49" charset="0"/>
-              </a:rPr>
-              <a:t> = </a:t>
-            </a:r>
-            <a:r>
-              <a:rPr lang="es-ES" b="0" dirty="0" err="1">
-                <a:solidFill>
-                  <a:srgbClr val="D35400"/>
-                </a:solidFill>
-                <a:effectLst/>
-                <a:latin typeface="Consolas" panose="020B0609020204030204" pitchFamily="49" charset="0"/>
-              </a:rPr>
-              <a:t>String</a:t>
-            </a:r>
-            <a:r>
-              <a:rPr lang="es-ES" b="0" dirty="0">
-                <a:solidFill>
-                  <a:srgbClr val="434F54"/>
-                </a:solidFill>
-                <a:effectLst/>
-                <a:latin typeface="Consolas" panose="020B0609020204030204" pitchFamily="49" charset="0"/>
-              </a:rPr>
-              <a:t>(</a:t>
-            </a:r>
-            <a:r>
-              <a:rPr lang="es-ES" b="0" dirty="0" err="1">
-                <a:solidFill>
-                  <a:srgbClr val="4E5B61"/>
-                </a:solidFill>
-                <a:effectLst/>
-                <a:latin typeface="Consolas" panose="020B0609020204030204" pitchFamily="49" charset="0"/>
-              </a:rPr>
-              <a:t>stringTwo</a:t>
-            </a:r>
-            <a:r>
-              <a:rPr lang="es-ES" b="0" dirty="0">
-                <a:solidFill>
-                  <a:srgbClr val="4E5B61"/>
-                </a:solidFill>
-                <a:effectLst/>
-                <a:latin typeface="Consolas" panose="020B0609020204030204" pitchFamily="49" charset="0"/>
-              </a:rPr>
-              <a:t> + </a:t>
-            </a:r>
-            <a:r>
-              <a:rPr lang="es-ES" b="0" dirty="0">
-                <a:solidFill>
-                  <a:srgbClr val="005C5F"/>
-                </a:solidFill>
-                <a:effectLst/>
-                <a:latin typeface="Consolas" panose="020B0609020204030204" pitchFamily="49" charset="0"/>
-              </a:rPr>
-              <a:t>" </a:t>
-            </a:r>
-            <a:r>
-              <a:rPr lang="es-ES" b="0" dirty="0" err="1">
-                <a:solidFill>
-                  <a:srgbClr val="005C5F"/>
-                </a:solidFill>
-                <a:effectLst/>
-                <a:latin typeface="Consolas" panose="020B0609020204030204" pitchFamily="49" charset="0"/>
-              </a:rPr>
-              <a:t>with</a:t>
-            </a:r>
-            <a:r>
-              <a:rPr lang="es-ES" b="0" dirty="0">
-                <a:solidFill>
-                  <a:srgbClr val="005C5F"/>
-                </a:solidFill>
-                <a:effectLst/>
-                <a:latin typeface="Consolas" panose="020B0609020204030204" pitchFamily="49" charset="0"/>
-              </a:rPr>
-              <a:t> more"</a:t>
-            </a:r>
-            <a:r>
-              <a:rPr lang="es-ES" b="0" dirty="0">
-                <a:solidFill>
-                  <a:srgbClr val="434F54"/>
-                </a:solidFill>
-                <a:effectLst/>
-                <a:latin typeface="Consolas" panose="020B0609020204030204" pitchFamily="49" charset="0"/>
-              </a:rPr>
-              <a:t>)</a:t>
-            </a:r>
-            <a:r>
-              <a:rPr lang="es-ES" b="0" dirty="0">
-                <a:solidFill>
-                  <a:srgbClr val="4E5B61"/>
-                </a:solidFill>
-                <a:effectLst/>
-                <a:latin typeface="Consolas" panose="020B0609020204030204" pitchFamily="49" charset="0"/>
-              </a:rPr>
-              <a:t>;</a:t>
-            </a:r>
-            <a:r>
-              <a:rPr lang="es-ES" b="0" dirty="0">
-                <a:solidFill>
-                  <a:srgbClr val="95A5A6"/>
-                </a:solidFill>
-                <a:effectLst/>
-                <a:latin typeface="Consolas" panose="020B0609020204030204" pitchFamily="49" charset="0"/>
-              </a:rPr>
-              <a:t>  </a:t>
-            </a:r>
-            <a:endParaRPr lang="es-ES" b="0" dirty="0">
-              <a:solidFill>
-                <a:srgbClr val="4E5B61"/>
-              </a:solidFill>
-              <a:effectLst/>
-              <a:latin typeface="Consolas" panose="020B0609020204030204" pitchFamily="49" charset="0"/>
-            </a:endParaRPr>
-          </a:p>
-          <a:p>
-            <a:pPr>
-              <a:lnSpc>
-                <a:spcPts val="3225"/>
-              </a:lnSpc>
-            </a:pPr>
-            <a:r>
-              <a:rPr lang="es-ES" b="0" dirty="0" err="1">
-                <a:solidFill>
-                  <a:srgbClr val="4E5B61"/>
-                </a:solidFill>
-                <a:effectLst/>
-                <a:latin typeface="Consolas" panose="020B0609020204030204" pitchFamily="49" charset="0"/>
-              </a:rPr>
-              <a:t>String</a:t>
-            </a:r>
-            <a:r>
-              <a:rPr lang="es-ES" b="0" dirty="0">
-                <a:solidFill>
-                  <a:srgbClr val="4E5B61"/>
-                </a:solidFill>
-                <a:effectLst/>
-                <a:latin typeface="Consolas" panose="020B0609020204030204" pitchFamily="49" charset="0"/>
-              </a:rPr>
-              <a:t> </a:t>
-            </a:r>
-            <a:r>
-              <a:rPr lang="es-ES" b="0" dirty="0" err="1">
-                <a:solidFill>
-                  <a:srgbClr val="4E5B61"/>
-                </a:solidFill>
-                <a:effectLst/>
-                <a:latin typeface="Consolas" panose="020B0609020204030204" pitchFamily="49" charset="0"/>
-              </a:rPr>
-              <a:t>stringOne</a:t>
-            </a:r>
-            <a:r>
-              <a:rPr lang="es-ES" b="0" dirty="0">
-                <a:solidFill>
-                  <a:srgbClr val="4E5B61"/>
-                </a:solidFill>
-                <a:effectLst/>
-                <a:latin typeface="Consolas" panose="020B0609020204030204" pitchFamily="49" charset="0"/>
-              </a:rPr>
-              <a:t> = </a:t>
-            </a:r>
-            <a:r>
-              <a:rPr lang="es-ES" b="0" dirty="0" err="1">
-                <a:solidFill>
-                  <a:srgbClr val="D35400"/>
-                </a:solidFill>
-                <a:effectLst/>
-                <a:latin typeface="Consolas" panose="020B0609020204030204" pitchFamily="49" charset="0"/>
-              </a:rPr>
-              <a:t>String</a:t>
-            </a:r>
-            <a:r>
-              <a:rPr lang="es-ES" b="0" dirty="0">
-                <a:solidFill>
-                  <a:srgbClr val="434F54"/>
-                </a:solidFill>
-                <a:effectLst/>
-                <a:latin typeface="Consolas" panose="020B0609020204030204" pitchFamily="49" charset="0"/>
-              </a:rPr>
-              <a:t>(</a:t>
-            </a:r>
-            <a:r>
-              <a:rPr lang="es-ES" b="0" dirty="0">
-                <a:solidFill>
-                  <a:srgbClr val="005C5F"/>
-                </a:solidFill>
-                <a:effectLst/>
-                <a:latin typeface="Consolas" panose="020B0609020204030204" pitchFamily="49" charset="0"/>
-              </a:rPr>
-              <a:t>13</a:t>
-            </a:r>
-            <a:r>
-              <a:rPr lang="es-ES" b="0" dirty="0">
-                <a:solidFill>
-                  <a:srgbClr val="434F54"/>
-                </a:solidFill>
-                <a:effectLst/>
-                <a:latin typeface="Consolas" panose="020B0609020204030204" pitchFamily="49" charset="0"/>
-              </a:rPr>
-              <a:t>)</a:t>
-            </a:r>
-            <a:r>
-              <a:rPr lang="es-ES" b="0" dirty="0">
-                <a:solidFill>
-                  <a:srgbClr val="4E5B61"/>
-                </a:solidFill>
-                <a:effectLst/>
-                <a:latin typeface="Consolas" panose="020B0609020204030204" pitchFamily="49" charset="0"/>
-              </a:rPr>
-              <a:t>;</a:t>
-            </a:r>
-            <a:r>
-              <a:rPr lang="es-ES" b="0" dirty="0">
-                <a:solidFill>
-                  <a:srgbClr val="95A5A6"/>
-                </a:solidFill>
-                <a:effectLst/>
-                <a:latin typeface="Consolas" panose="020B0609020204030204" pitchFamily="49" charset="0"/>
-              </a:rPr>
-              <a:t>                      </a:t>
-            </a:r>
-            <a:endParaRPr lang="es-ES" b="0" dirty="0">
-              <a:solidFill>
-                <a:srgbClr val="4E5B61"/>
-              </a:solidFill>
-              <a:effectLst/>
-              <a:latin typeface="Consolas" panose="020B0609020204030204" pitchFamily="49" charset="0"/>
-            </a:endParaRPr>
-          </a:p>
-          <a:p>
-            <a:pPr>
-              <a:lnSpc>
-                <a:spcPts val="3225"/>
-              </a:lnSpc>
-            </a:pPr>
-            <a:r>
-              <a:rPr lang="es-ES" b="0" dirty="0" err="1">
-                <a:solidFill>
-                  <a:srgbClr val="4E5B61"/>
-                </a:solidFill>
-                <a:effectLst/>
-                <a:latin typeface="Consolas" panose="020B0609020204030204" pitchFamily="49" charset="0"/>
-              </a:rPr>
-              <a:t>String</a:t>
-            </a:r>
-            <a:r>
-              <a:rPr lang="es-ES" b="0" dirty="0">
-                <a:solidFill>
-                  <a:srgbClr val="4E5B61"/>
-                </a:solidFill>
-                <a:effectLst/>
-                <a:latin typeface="Consolas" panose="020B0609020204030204" pitchFamily="49" charset="0"/>
-              </a:rPr>
-              <a:t> </a:t>
-            </a:r>
-            <a:r>
-              <a:rPr lang="es-ES" b="0" dirty="0" err="1">
-                <a:solidFill>
-                  <a:srgbClr val="4E5B61"/>
-                </a:solidFill>
-                <a:effectLst/>
-                <a:latin typeface="Consolas" panose="020B0609020204030204" pitchFamily="49" charset="0"/>
-              </a:rPr>
-              <a:t>stringOne</a:t>
-            </a:r>
-            <a:r>
-              <a:rPr lang="es-ES" b="0" dirty="0">
-                <a:solidFill>
-                  <a:srgbClr val="4E5B61"/>
-                </a:solidFill>
-                <a:effectLst/>
-                <a:latin typeface="Consolas" panose="020B0609020204030204" pitchFamily="49" charset="0"/>
-              </a:rPr>
-              <a:t> = </a:t>
-            </a:r>
-            <a:r>
-              <a:rPr lang="es-ES" b="0" dirty="0" err="1">
-                <a:solidFill>
-                  <a:srgbClr val="D35400"/>
-                </a:solidFill>
-                <a:effectLst/>
-                <a:latin typeface="Consolas" panose="020B0609020204030204" pitchFamily="49" charset="0"/>
-              </a:rPr>
-              <a:t>String</a:t>
-            </a:r>
-            <a:r>
-              <a:rPr lang="es-ES" b="0" dirty="0">
-                <a:solidFill>
-                  <a:srgbClr val="434F54"/>
-                </a:solidFill>
-                <a:effectLst/>
-                <a:latin typeface="Consolas" panose="020B0609020204030204" pitchFamily="49" charset="0"/>
-              </a:rPr>
-              <a:t>(</a:t>
-            </a:r>
-            <a:r>
-              <a:rPr lang="es-ES" b="0" dirty="0">
-                <a:solidFill>
-                  <a:srgbClr val="005C5F"/>
-                </a:solidFill>
-                <a:effectLst/>
-                <a:latin typeface="Consolas" panose="020B0609020204030204" pitchFamily="49" charset="0"/>
-              </a:rPr>
-              <a:t>45</a:t>
-            </a:r>
-            <a:r>
-              <a:rPr lang="es-ES" b="0" dirty="0">
-                <a:solidFill>
-                  <a:srgbClr val="4E5B61"/>
-                </a:solidFill>
-                <a:effectLst/>
-                <a:latin typeface="Consolas" panose="020B0609020204030204" pitchFamily="49" charset="0"/>
-              </a:rPr>
-              <a:t>, HEX</a:t>
-            </a:r>
-            <a:r>
-              <a:rPr lang="es-ES" b="0" dirty="0">
-                <a:solidFill>
-                  <a:srgbClr val="434F54"/>
-                </a:solidFill>
-                <a:effectLst/>
-                <a:latin typeface="Consolas" panose="020B0609020204030204" pitchFamily="49" charset="0"/>
-              </a:rPr>
-              <a:t>)</a:t>
-            </a:r>
-            <a:r>
-              <a:rPr lang="es-ES" b="0" dirty="0">
-                <a:solidFill>
-                  <a:srgbClr val="4E5B61"/>
-                </a:solidFill>
-                <a:effectLst/>
-                <a:latin typeface="Consolas" panose="020B0609020204030204" pitchFamily="49" charset="0"/>
-              </a:rPr>
-              <a:t>;</a:t>
-            </a:r>
-            <a:r>
-              <a:rPr lang="es-ES" b="0" dirty="0">
-                <a:solidFill>
-                  <a:srgbClr val="95A5A6"/>
-                </a:solidFill>
-                <a:effectLst/>
-                <a:latin typeface="Consolas" panose="020B0609020204030204" pitchFamily="49" charset="0"/>
-              </a:rPr>
-              <a:t>                  </a:t>
-            </a:r>
-            <a:endParaRPr lang="es-ES" b="0" dirty="0">
-              <a:solidFill>
-                <a:srgbClr val="4E5B61"/>
-              </a:solidFill>
-              <a:effectLst/>
-              <a:latin typeface="Consolas" panose="020B0609020204030204" pitchFamily="49" charset="0"/>
-            </a:endParaRPr>
-          </a:p>
-          <a:p>
-            <a:pPr>
-              <a:lnSpc>
-                <a:spcPts val="3225"/>
-              </a:lnSpc>
-            </a:pPr>
-            <a:r>
-              <a:rPr lang="es-ES" b="0" dirty="0" err="1">
-                <a:solidFill>
-                  <a:srgbClr val="4E5B61"/>
-                </a:solidFill>
-                <a:effectLst/>
-                <a:latin typeface="Consolas" panose="020B0609020204030204" pitchFamily="49" charset="0"/>
-              </a:rPr>
-              <a:t>String</a:t>
-            </a:r>
-            <a:r>
-              <a:rPr lang="es-ES" b="0" dirty="0">
-                <a:solidFill>
-                  <a:srgbClr val="4E5B61"/>
-                </a:solidFill>
-                <a:effectLst/>
-                <a:latin typeface="Consolas" panose="020B0609020204030204" pitchFamily="49" charset="0"/>
-              </a:rPr>
-              <a:t> </a:t>
-            </a:r>
-            <a:r>
-              <a:rPr lang="es-ES" b="0" dirty="0" err="1">
-                <a:solidFill>
-                  <a:srgbClr val="4E5B61"/>
-                </a:solidFill>
-                <a:effectLst/>
-                <a:latin typeface="Consolas" panose="020B0609020204030204" pitchFamily="49" charset="0"/>
-              </a:rPr>
-              <a:t>stringOne</a:t>
-            </a:r>
-            <a:r>
-              <a:rPr lang="es-ES" b="0" dirty="0">
-                <a:solidFill>
-                  <a:srgbClr val="4E5B61"/>
-                </a:solidFill>
-                <a:effectLst/>
-                <a:latin typeface="Consolas" panose="020B0609020204030204" pitchFamily="49" charset="0"/>
-              </a:rPr>
-              <a:t> = </a:t>
-            </a:r>
-            <a:r>
-              <a:rPr lang="es-ES" b="0" dirty="0" err="1">
-                <a:solidFill>
-                  <a:srgbClr val="D35400"/>
-                </a:solidFill>
-                <a:effectLst/>
-                <a:latin typeface="Consolas" panose="020B0609020204030204" pitchFamily="49" charset="0"/>
-              </a:rPr>
-              <a:t>String</a:t>
-            </a:r>
-            <a:r>
-              <a:rPr lang="es-ES" b="0" dirty="0">
-                <a:solidFill>
-                  <a:srgbClr val="434F54"/>
-                </a:solidFill>
-                <a:effectLst/>
-                <a:latin typeface="Consolas" panose="020B0609020204030204" pitchFamily="49" charset="0"/>
-              </a:rPr>
-              <a:t>(</a:t>
-            </a:r>
-            <a:r>
-              <a:rPr lang="es-ES" b="0" dirty="0">
-                <a:solidFill>
-                  <a:srgbClr val="005C5F"/>
-                </a:solidFill>
-                <a:effectLst/>
-                <a:latin typeface="Consolas" panose="020B0609020204030204" pitchFamily="49" charset="0"/>
-              </a:rPr>
-              <a:t>255</a:t>
-            </a:r>
-            <a:r>
-              <a:rPr lang="es-ES" b="0" dirty="0">
-                <a:solidFill>
-                  <a:srgbClr val="4E5B61"/>
-                </a:solidFill>
-                <a:effectLst/>
-                <a:latin typeface="Consolas" panose="020B0609020204030204" pitchFamily="49" charset="0"/>
-              </a:rPr>
-              <a:t>, BIN</a:t>
-            </a:r>
-            <a:r>
-              <a:rPr lang="es-ES" b="0" dirty="0">
-                <a:solidFill>
-                  <a:srgbClr val="434F54"/>
-                </a:solidFill>
-                <a:effectLst/>
-                <a:latin typeface="Consolas" panose="020B0609020204030204" pitchFamily="49" charset="0"/>
-              </a:rPr>
-              <a:t>)</a:t>
-            </a:r>
-            <a:r>
-              <a:rPr lang="es-ES" b="0" dirty="0">
-                <a:solidFill>
-                  <a:srgbClr val="4E5B61"/>
-                </a:solidFill>
-                <a:effectLst/>
-                <a:latin typeface="Consolas" panose="020B0609020204030204" pitchFamily="49" charset="0"/>
-              </a:rPr>
-              <a:t>;</a:t>
-            </a:r>
-            <a:r>
-              <a:rPr lang="es-ES" b="0" dirty="0">
-                <a:solidFill>
-                  <a:srgbClr val="95A5A6"/>
-                </a:solidFill>
-                <a:effectLst/>
-                <a:latin typeface="Consolas" panose="020B0609020204030204" pitchFamily="49" charset="0"/>
-              </a:rPr>
-              <a:t>                          </a:t>
-            </a:r>
-            <a:endParaRPr lang="es-ES" b="0" dirty="0">
-              <a:solidFill>
-                <a:srgbClr val="4E5B61"/>
-              </a:solidFill>
-              <a:effectLst/>
-              <a:latin typeface="Consolas" panose="020B0609020204030204" pitchFamily="49" charset="0"/>
-            </a:endParaRPr>
-          </a:p>
-          <a:p>
-            <a:pPr>
-              <a:lnSpc>
-                <a:spcPts val="3225"/>
-              </a:lnSpc>
-            </a:pPr>
-            <a:r>
-              <a:rPr lang="es-ES" b="0" dirty="0" err="1">
-                <a:solidFill>
-                  <a:srgbClr val="4E5B61"/>
-                </a:solidFill>
-                <a:effectLst/>
-                <a:latin typeface="Consolas" panose="020B0609020204030204" pitchFamily="49" charset="0"/>
-              </a:rPr>
-              <a:t>String</a:t>
-            </a:r>
-            <a:r>
-              <a:rPr lang="es-ES" b="0" dirty="0">
-                <a:solidFill>
-                  <a:srgbClr val="4E5B61"/>
-                </a:solidFill>
-                <a:effectLst/>
-                <a:latin typeface="Consolas" panose="020B0609020204030204" pitchFamily="49" charset="0"/>
-              </a:rPr>
-              <a:t> </a:t>
-            </a:r>
-            <a:r>
-              <a:rPr lang="es-ES" b="0" dirty="0" err="1">
-                <a:solidFill>
-                  <a:srgbClr val="4E5B61"/>
-                </a:solidFill>
-                <a:effectLst/>
-                <a:latin typeface="Consolas" panose="020B0609020204030204" pitchFamily="49" charset="0"/>
-              </a:rPr>
-              <a:t>stringOne</a:t>
-            </a:r>
-            <a:r>
-              <a:rPr lang="es-ES" b="0" dirty="0">
-                <a:solidFill>
-                  <a:srgbClr val="4E5B61"/>
-                </a:solidFill>
-                <a:effectLst/>
-                <a:latin typeface="Consolas" panose="020B0609020204030204" pitchFamily="49" charset="0"/>
-              </a:rPr>
-              <a:t> = </a:t>
-            </a:r>
-            <a:r>
-              <a:rPr lang="es-ES" b="0" dirty="0" err="1">
-                <a:solidFill>
-                  <a:srgbClr val="D35400"/>
-                </a:solidFill>
-                <a:effectLst/>
-                <a:latin typeface="Consolas" panose="020B0609020204030204" pitchFamily="49" charset="0"/>
-              </a:rPr>
-              <a:t>String</a:t>
-            </a:r>
-            <a:r>
-              <a:rPr lang="es-ES" b="0" dirty="0">
-                <a:solidFill>
-                  <a:srgbClr val="434F54"/>
-                </a:solidFill>
-                <a:effectLst/>
-                <a:latin typeface="Consolas" panose="020B0609020204030204" pitchFamily="49" charset="0"/>
-              </a:rPr>
-              <a:t>(</a:t>
-            </a:r>
-            <a:r>
-              <a:rPr lang="es-ES" b="0" dirty="0">
-                <a:solidFill>
-                  <a:srgbClr val="005C5F"/>
-                </a:solidFill>
-                <a:effectLst/>
-                <a:latin typeface="Consolas" panose="020B0609020204030204" pitchFamily="49" charset="0"/>
-              </a:rPr>
-              <a:t>5.698</a:t>
-            </a:r>
-            <a:r>
-              <a:rPr lang="es-ES" b="0" dirty="0">
-                <a:solidFill>
-                  <a:srgbClr val="4E5B61"/>
-                </a:solidFill>
-                <a:effectLst/>
-                <a:latin typeface="Consolas" panose="020B0609020204030204" pitchFamily="49" charset="0"/>
-              </a:rPr>
-              <a:t>, </a:t>
-            </a:r>
-            <a:r>
-              <a:rPr lang="es-ES" b="0" dirty="0">
-                <a:solidFill>
-                  <a:srgbClr val="005C5F"/>
-                </a:solidFill>
-                <a:effectLst/>
-                <a:latin typeface="Consolas" panose="020B0609020204030204" pitchFamily="49" charset="0"/>
-              </a:rPr>
-              <a:t>3</a:t>
-            </a:r>
-            <a:r>
-              <a:rPr lang="es-ES" b="0" dirty="0">
-                <a:solidFill>
-                  <a:srgbClr val="434F54"/>
-                </a:solidFill>
-                <a:effectLst/>
-                <a:latin typeface="Consolas" panose="020B0609020204030204" pitchFamily="49" charset="0"/>
-              </a:rPr>
-              <a:t>)</a:t>
-            </a:r>
-            <a:r>
-              <a:rPr lang="es-ES" b="0" dirty="0">
-                <a:solidFill>
-                  <a:srgbClr val="4E5B61"/>
-                </a:solidFill>
-                <a:effectLst/>
-                <a:latin typeface="Consolas" panose="020B0609020204030204" pitchFamily="49" charset="0"/>
-              </a:rPr>
-              <a:t>;</a:t>
-            </a:r>
-          </a:p>
-        </p:txBody>
-      </p:sp>
+      </p:pic>
     </p:spTree>
     <p:extLst>
       <p:ext uri="{BB962C8B-B14F-4D97-AF65-F5344CB8AC3E}">
-        <p14:creationId xmlns:p14="http://schemas.microsoft.com/office/powerpoint/2010/main" val="329847634"/>
+        <p14:creationId xmlns:p14="http://schemas.microsoft.com/office/powerpoint/2010/main" val="1577065435"/>
       </p:ext>
     </p:extLst>
   </p:cSld>
@@ -15669,6 +14657,1513 @@
 </file>
 
 <file path=ppt/slides/slide20.xml><?xml version="1.0" encoding="utf-8"?>
+<p:sld xmlns:a="http://schemas.openxmlformats.org/drawingml/2006/main" xmlns:r="http://schemas.openxmlformats.org/officeDocument/2006/relationships" xmlns:p="http://schemas.openxmlformats.org/presentationml/2006/main">
+  <p:cSld>
+    <p:spTree>
+      <p:nvGrpSpPr>
+        <p:cNvPr id="1" name="">
+          <a:extLst>
+            <a:ext uri="{FF2B5EF4-FFF2-40B4-BE49-F238E27FC236}">
+              <a16:creationId xmlns:a16="http://schemas.microsoft.com/office/drawing/2014/main" id="{E9B60A10-45B8-190A-43E2-2E494837C264}"/>
+            </a:ext>
+          </a:extLst>
+        </p:cNvPr>
+        <p:cNvGrpSpPr/>
+        <p:nvPr/>
+      </p:nvGrpSpPr>
+      <p:grpSpPr>
+        <a:xfrm>
+          <a:off x="0" y="0"/>
+          <a:ext cx="0" cy="0"/>
+          <a:chOff x="0" y="0"/>
+          <a:chExt cx="0" cy="0"/>
+        </a:xfrm>
+      </p:grpSpPr>
+      <p:sp>
+        <p:nvSpPr>
+          <p:cNvPr id="2" name="Título 1">
+            <a:extLst>
+              <a:ext uri="{FF2B5EF4-FFF2-40B4-BE49-F238E27FC236}">
+                <a16:creationId xmlns:a16="http://schemas.microsoft.com/office/drawing/2014/main" id="{42595923-A22A-ABC8-A24F-F812E75A8C23}"/>
+              </a:ext>
+            </a:extLst>
+          </p:cNvPr>
+          <p:cNvSpPr>
+            <a:spLocks noGrp="1"/>
+          </p:cNvSpPr>
+          <p:nvPr>
+            <p:ph type="title" idx="4294967295"/>
+          </p:nvPr>
+        </p:nvSpPr>
+        <p:spPr>
+          <a:xfrm>
+            <a:off x="457200" y="-16941"/>
+            <a:ext cx="8229600" cy="1143000"/>
+          </a:xfrm>
+        </p:spPr>
+        <p:txBody>
+          <a:bodyPr>
+            <a:normAutofit/>
+          </a:bodyPr>
+          <a:lstStyle/>
+          <a:p>
+            <a:pPr algn="ctr"/>
+            <a:r>
+              <a:rPr lang="es-ES" sz="4400" dirty="0"/>
+              <a:t>Ejemplo Objeto serial</a:t>
+            </a:r>
+          </a:p>
+        </p:txBody>
+      </p:sp>
+      <p:sp>
+        <p:nvSpPr>
+          <p:cNvPr id="7" name="CuadroTexto 6">
+            <a:extLst>
+              <a:ext uri="{FF2B5EF4-FFF2-40B4-BE49-F238E27FC236}">
+                <a16:creationId xmlns:a16="http://schemas.microsoft.com/office/drawing/2014/main" id="{3EDC0839-2BD6-7260-8FBC-D400DF910B2B}"/>
+              </a:ext>
+            </a:extLst>
+          </p:cNvPr>
+          <p:cNvSpPr txBox="1"/>
+          <p:nvPr/>
+        </p:nvSpPr>
+        <p:spPr>
+          <a:xfrm>
+            <a:off x="1547664" y="682094"/>
+            <a:ext cx="7252094" cy="5493812"/>
+          </a:xfrm>
+          <a:prstGeom prst="rect">
+            <a:avLst/>
+          </a:prstGeom>
+          <a:noFill/>
+        </p:spPr>
+        <p:txBody>
+          <a:bodyPr wrap="square">
+            <a:spAutoFit/>
+          </a:bodyPr>
+          <a:lstStyle/>
+          <a:p>
+            <a:r>
+              <a:rPr lang="es-ES" sz="1300" dirty="0" err="1"/>
+              <a:t>void</a:t>
+            </a:r>
+            <a:r>
+              <a:rPr lang="es-ES" sz="1300" dirty="0"/>
+              <a:t> </a:t>
+            </a:r>
+            <a:r>
+              <a:rPr lang="es-ES" sz="1300" dirty="0" err="1"/>
+              <a:t>setup</a:t>
+            </a:r>
+            <a:r>
+              <a:rPr lang="es-ES" sz="1300" dirty="0"/>
+              <a:t>() {</a:t>
+            </a:r>
+          </a:p>
+          <a:p>
+            <a:r>
+              <a:rPr lang="es-ES" sz="1300" dirty="0"/>
+              <a:t>     </a:t>
+            </a:r>
+            <a:r>
+              <a:rPr lang="es-ES" sz="1300" dirty="0" err="1"/>
+              <a:t>Serial.begin</a:t>
+            </a:r>
+            <a:r>
+              <a:rPr lang="es-ES" sz="1300" dirty="0"/>
+              <a:t>(9600); </a:t>
+            </a:r>
+          </a:p>
+          <a:p>
+            <a:r>
+              <a:rPr lang="es-ES" sz="1300" dirty="0"/>
+              <a:t>     </a:t>
+            </a:r>
+            <a:r>
+              <a:rPr lang="es-ES" sz="1300" dirty="0" err="1"/>
+              <a:t>pinMode</a:t>
+            </a:r>
+            <a:r>
+              <a:rPr lang="es-ES" sz="1300" dirty="0"/>
+              <a:t>(8,OUTPUT);</a:t>
+            </a:r>
+          </a:p>
+          <a:p>
+            <a:r>
+              <a:rPr lang="es-ES" sz="1300" dirty="0"/>
+              <a:t>     </a:t>
+            </a:r>
+            <a:r>
+              <a:rPr lang="es-ES" sz="1300" dirty="0" err="1"/>
+              <a:t>pinMode</a:t>
+            </a:r>
+            <a:r>
+              <a:rPr lang="es-ES" sz="1300" dirty="0"/>
+              <a:t>(9,OUTPUT);</a:t>
+            </a:r>
+          </a:p>
+          <a:p>
+            <a:r>
+              <a:rPr lang="es-ES" sz="1300" dirty="0"/>
+              <a:t>}</a:t>
+            </a:r>
+          </a:p>
+          <a:p>
+            <a:r>
+              <a:rPr lang="es-ES" sz="1300" dirty="0" err="1"/>
+              <a:t>void</a:t>
+            </a:r>
+            <a:r>
+              <a:rPr lang="es-ES" sz="1300" dirty="0"/>
+              <a:t> </a:t>
+            </a:r>
+            <a:r>
+              <a:rPr lang="es-ES" sz="1300" dirty="0" err="1"/>
+              <a:t>loop</a:t>
+            </a:r>
+            <a:r>
+              <a:rPr lang="es-ES" sz="1300" dirty="0"/>
+              <a:t>() {</a:t>
+            </a:r>
+          </a:p>
+          <a:p>
+            <a:r>
+              <a:rPr lang="es-ES" sz="1300" dirty="0"/>
+              <a:t>  </a:t>
+            </a:r>
+            <a:r>
+              <a:rPr lang="es-ES" sz="1300" dirty="0" err="1"/>
+              <a:t>if</a:t>
+            </a:r>
+            <a:r>
+              <a:rPr lang="es-ES" sz="1300" dirty="0"/>
+              <a:t>(</a:t>
+            </a:r>
+            <a:r>
+              <a:rPr lang="es-ES" sz="1300" dirty="0" err="1"/>
+              <a:t>Serial.available</a:t>
+            </a:r>
+            <a:r>
+              <a:rPr lang="es-ES" sz="1300" dirty="0"/>
+              <a:t>()&gt;0){</a:t>
+            </a:r>
+          </a:p>
+          <a:p>
+            <a:r>
+              <a:rPr lang="es-ES" sz="1300" dirty="0"/>
+              <a:t>    </a:t>
+            </a:r>
+            <a:r>
+              <a:rPr lang="es-ES" sz="1300" dirty="0" err="1"/>
+              <a:t>char</a:t>
+            </a:r>
+            <a:r>
+              <a:rPr lang="es-ES" sz="1300" dirty="0"/>
+              <a:t> valor=</a:t>
+            </a:r>
+            <a:r>
+              <a:rPr lang="es-ES" sz="1300" dirty="0" err="1"/>
+              <a:t>Serial.read</a:t>
+            </a:r>
+            <a:r>
+              <a:rPr lang="es-ES" sz="1300" dirty="0"/>
+              <a:t>();</a:t>
+            </a:r>
+          </a:p>
+          <a:p>
+            <a:r>
+              <a:rPr lang="es-ES" sz="1300" dirty="0"/>
+              <a:t>    switch(valor){</a:t>
+            </a:r>
+          </a:p>
+          <a:p>
+            <a:r>
+              <a:rPr lang="es-ES" sz="1300" dirty="0"/>
+              <a:t>      case 'R':</a:t>
+            </a:r>
+          </a:p>
+          <a:p>
+            <a:r>
+              <a:rPr lang="es-ES" sz="1300" dirty="0"/>
+              <a:t>          </a:t>
+            </a:r>
+            <a:r>
+              <a:rPr lang="es-ES" sz="1300" dirty="0" err="1"/>
+              <a:t>digitalWrite</a:t>
+            </a:r>
+            <a:r>
+              <a:rPr lang="es-ES" sz="1300" dirty="0"/>
+              <a:t>(9,HIGH);</a:t>
+            </a:r>
+          </a:p>
+          <a:p>
+            <a:r>
+              <a:rPr lang="es-ES" sz="1300" dirty="0"/>
+              <a:t>          break;</a:t>
+            </a:r>
+          </a:p>
+          <a:p>
+            <a:r>
+              <a:rPr lang="es-ES" sz="1300" dirty="0"/>
+              <a:t>        case 'r':</a:t>
+            </a:r>
+          </a:p>
+          <a:p>
+            <a:r>
+              <a:rPr lang="es-ES" sz="1300" dirty="0"/>
+              <a:t>          </a:t>
+            </a:r>
+            <a:r>
+              <a:rPr lang="es-ES" sz="1300" dirty="0" err="1"/>
+              <a:t>digitalWrite</a:t>
+            </a:r>
+            <a:r>
+              <a:rPr lang="es-ES" sz="1300" dirty="0"/>
+              <a:t>(9,LOW);</a:t>
+            </a:r>
+          </a:p>
+          <a:p>
+            <a:r>
+              <a:rPr lang="es-ES" sz="1300" dirty="0"/>
+              <a:t>          break;</a:t>
+            </a:r>
+          </a:p>
+          <a:p>
+            <a:r>
+              <a:rPr lang="es-ES" sz="1300" dirty="0"/>
+              <a:t>        case 'V':</a:t>
+            </a:r>
+          </a:p>
+          <a:p>
+            <a:r>
+              <a:rPr lang="es-ES" sz="1300" dirty="0"/>
+              <a:t>          </a:t>
+            </a:r>
+            <a:r>
+              <a:rPr lang="es-ES" sz="1300" dirty="0" err="1"/>
+              <a:t>digitalWrite</a:t>
+            </a:r>
+            <a:r>
+              <a:rPr lang="es-ES" sz="1300" dirty="0"/>
+              <a:t>(8,HIGH);</a:t>
+            </a:r>
+          </a:p>
+          <a:p>
+            <a:r>
+              <a:rPr lang="es-ES" sz="1300" dirty="0"/>
+              <a:t>          break;</a:t>
+            </a:r>
+          </a:p>
+          <a:p>
+            <a:r>
+              <a:rPr lang="es-ES" sz="1300" dirty="0"/>
+              <a:t>        case 'v':</a:t>
+            </a:r>
+          </a:p>
+          <a:p>
+            <a:r>
+              <a:rPr lang="es-ES" sz="1300" dirty="0"/>
+              <a:t>          </a:t>
+            </a:r>
+            <a:r>
+              <a:rPr lang="es-ES" sz="1300" dirty="0" err="1"/>
+              <a:t>digitalWrite</a:t>
+            </a:r>
+            <a:r>
+              <a:rPr lang="es-ES" sz="1300" dirty="0"/>
+              <a:t>(8,LOW);</a:t>
+            </a:r>
+          </a:p>
+          <a:p>
+            <a:r>
+              <a:rPr lang="es-ES" sz="1300" dirty="0"/>
+              <a:t>          break;</a:t>
+            </a:r>
+          </a:p>
+          <a:p>
+            <a:r>
+              <a:rPr lang="es-ES" sz="1300" dirty="0"/>
+              <a:t>        default:</a:t>
+            </a:r>
+          </a:p>
+          <a:p>
+            <a:r>
+              <a:rPr lang="es-ES" sz="1300" dirty="0"/>
+              <a:t>          </a:t>
+            </a:r>
+            <a:r>
+              <a:rPr lang="es-ES" sz="1300" dirty="0" err="1"/>
+              <a:t>digitalWrite</a:t>
+            </a:r>
+            <a:r>
+              <a:rPr lang="es-ES" sz="1300" dirty="0"/>
+              <a:t>(8,LOW);</a:t>
+            </a:r>
+          </a:p>
+          <a:p>
+            <a:r>
+              <a:rPr lang="es-ES" sz="1300" dirty="0"/>
+              <a:t>            </a:t>
+            </a:r>
+            <a:r>
+              <a:rPr lang="es-ES" sz="1300" dirty="0" err="1"/>
+              <a:t>digitalWrite</a:t>
+            </a:r>
+            <a:r>
+              <a:rPr lang="es-ES" sz="1300" dirty="0"/>
+              <a:t>(9,LOW);</a:t>
+            </a:r>
+          </a:p>
+          <a:p>
+            <a:r>
+              <a:rPr lang="es-ES" sz="1300" dirty="0"/>
+              <a:t>    }</a:t>
+            </a:r>
+          </a:p>
+          <a:p>
+            <a:r>
+              <a:rPr lang="es-ES" sz="1300" dirty="0"/>
+              <a:t>  }</a:t>
+            </a:r>
+          </a:p>
+          <a:p>
+            <a:r>
+              <a:rPr lang="es-ES" sz="1300" dirty="0"/>
+              <a:t>}</a:t>
+            </a:r>
+          </a:p>
+        </p:txBody>
+      </p:sp>
+    </p:spTree>
+    <p:extLst>
+      <p:ext uri="{BB962C8B-B14F-4D97-AF65-F5344CB8AC3E}">
+        <p14:creationId xmlns:p14="http://schemas.microsoft.com/office/powerpoint/2010/main" val="337568616"/>
+      </p:ext>
+    </p:extLst>
+  </p:cSld>
+  <p:clrMapOvr>
+    <a:masterClrMapping/>
+  </p:clrMapOvr>
+</p:sld>
+</file>
+
+<file path=ppt/slides/slide21.xml><?xml version="1.0" encoding="utf-8"?>
+<p:sld xmlns:a="http://schemas.openxmlformats.org/drawingml/2006/main" xmlns:r="http://schemas.openxmlformats.org/officeDocument/2006/relationships" xmlns:p="http://schemas.openxmlformats.org/presentationml/2006/main">
+  <p:cSld>
+    <p:spTree>
+      <p:nvGrpSpPr>
+        <p:cNvPr id="1" name="">
+          <a:extLst>
+            <a:ext uri="{FF2B5EF4-FFF2-40B4-BE49-F238E27FC236}">
+              <a16:creationId xmlns:a16="http://schemas.microsoft.com/office/drawing/2014/main" id="{9884729A-8056-8ED0-A043-E20B4CB169EF}"/>
+            </a:ext>
+          </a:extLst>
+        </p:cNvPr>
+        <p:cNvGrpSpPr/>
+        <p:nvPr/>
+      </p:nvGrpSpPr>
+      <p:grpSpPr>
+        <a:xfrm>
+          <a:off x="0" y="0"/>
+          <a:ext cx="0" cy="0"/>
+          <a:chOff x="0" y="0"/>
+          <a:chExt cx="0" cy="0"/>
+        </a:xfrm>
+      </p:grpSpPr>
+      <p:sp>
+        <p:nvSpPr>
+          <p:cNvPr id="2" name="Título 1">
+            <a:extLst>
+              <a:ext uri="{FF2B5EF4-FFF2-40B4-BE49-F238E27FC236}">
+                <a16:creationId xmlns:a16="http://schemas.microsoft.com/office/drawing/2014/main" id="{B2436B42-099C-5AD2-141F-C3A00E107839}"/>
+              </a:ext>
+            </a:extLst>
+          </p:cNvPr>
+          <p:cNvSpPr>
+            <a:spLocks noGrp="1"/>
+          </p:cNvSpPr>
+          <p:nvPr>
+            <p:ph type="title" idx="4294967295"/>
+          </p:nvPr>
+        </p:nvSpPr>
+        <p:spPr>
+          <a:xfrm>
+            <a:off x="539552" y="260648"/>
+            <a:ext cx="8229600" cy="1143000"/>
+          </a:xfrm>
+        </p:spPr>
+        <p:txBody>
+          <a:bodyPr>
+            <a:normAutofit/>
+          </a:bodyPr>
+          <a:lstStyle/>
+          <a:p>
+            <a:pPr algn="ctr"/>
+            <a:r>
+              <a:rPr lang="es-ES" sz="4400" dirty="0"/>
+              <a:t>Objeto </a:t>
+            </a:r>
+            <a:r>
+              <a:rPr lang="es-ES" sz="4400" dirty="0" err="1"/>
+              <a:t>string</a:t>
+            </a:r>
+            <a:endParaRPr lang="es-ES" sz="4400" dirty="0"/>
+          </a:p>
+        </p:txBody>
+      </p:sp>
+      <p:sp>
+        <p:nvSpPr>
+          <p:cNvPr id="7" name="CuadroTexto 6">
+            <a:extLst>
+              <a:ext uri="{FF2B5EF4-FFF2-40B4-BE49-F238E27FC236}">
+                <a16:creationId xmlns:a16="http://schemas.microsoft.com/office/drawing/2014/main" id="{760F4F46-5905-A279-E871-2560392E3421}"/>
+              </a:ext>
+            </a:extLst>
+          </p:cNvPr>
+          <p:cNvSpPr txBox="1"/>
+          <p:nvPr/>
+        </p:nvSpPr>
+        <p:spPr>
+          <a:xfrm>
+            <a:off x="539552" y="1052736"/>
+            <a:ext cx="8064896" cy="3332066"/>
+          </a:xfrm>
+          <a:prstGeom prst="rect">
+            <a:avLst/>
+          </a:prstGeom>
+          <a:noFill/>
+        </p:spPr>
+        <p:txBody>
+          <a:bodyPr wrap="square">
+            <a:spAutoFit/>
+          </a:bodyPr>
+          <a:lstStyle/>
+          <a:p>
+            <a:pPr>
+              <a:lnSpc>
+                <a:spcPts val="3225"/>
+              </a:lnSpc>
+            </a:pPr>
+            <a:r>
+              <a:rPr lang="es-ES" b="0" dirty="0" err="1">
+                <a:solidFill>
+                  <a:srgbClr val="4E5B61"/>
+                </a:solidFill>
+                <a:effectLst/>
+                <a:latin typeface="Consolas" panose="020B0609020204030204" pitchFamily="49" charset="0"/>
+              </a:rPr>
+              <a:t>String</a:t>
+            </a:r>
+            <a:r>
+              <a:rPr lang="es-ES" b="0" dirty="0">
+                <a:solidFill>
+                  <a:srgbClr val="4E5B61"/>
+                </a:solidFill>
+                <a:effectLst/>
+                <a:latin typeface="Consolas" panose="020B0609020204030204" pitchFamily="49" charset="0"/>
+              </a:rPr>
+              <a:t> </a:t>
+            </a:r>
+            <a:r>
+              <a:rPr lang="es-ES" b="0" dirty="0" err="1">
+                <a:solidFill>
+                  <a:srgbClr val="4E5B61"/>
+                </a:solidFill>
+                <a:effectLst/>
+                <a:latin typeface="Consolas" panose="020B0609020204030204" pitchFamily="49" charset="0"/>
+              </a:rPr>
+              <a:t>stringOne</a:t>
+            </a:r>
+            <a:r>
+              <a:rPr lang="es-ES" b="0" dirty="0">
+                <a:solidFill>
+                  <a:srgbClr val="4E5B61"/>
+                </a:solidFill>
+                <a:effectLst/>
+                <a:latin typeface="Consolas" panose="020B0609020204030204" pitchFamily="49" charset="0"/>
+              </a:rPr>
+              <a:t> = </a:t>
+            </a:r>
+            <a:r>
+              <a:rPr lang="es-ES" b="0" dirty="0">
+                <a:solidFill>
+                  <a:srgbClr val="005C5F"/>
+                </a:solidFill>
+                <a:effectLst/>
+                <a:latin typeface="Consolas" panose="020B0609020204030204" pitchFamily="49" charset="0"/>
+              </a:rPr>
+              <a:t>"</a:t>
+            </a:r>
+            <a:r>
+              <a:rPr lang="es-ES" b="0" dirty="0" err="1">
+                <a:solidFill>
+                  <a:srgbClr val="005C5F"/>
+                </a:solidFill>
+                <a:effectLst/>
+                <a:latin typeface="Consolas" panose="020B0609020204030204" pitchFamily="49" charset="0"/>
+              </a:rPr>
+              <a:t>Hello</a:t>
+            </a:r>
+            <a:r>
+              <a:rPr lang="es-ES" b="0" dirty="0">
+                <a:solidFill>
+                  <a:srgbClr val="005C5F"/>
+                </a:solidFill>
+                <a:effectLst/>
+                <a:latin typeface="Consolas" panose="020B0609020204030204" pitchFamily="49" charset="0"/>
+              </a:rPr>
+              <a:t> </a:t>
+            </a:r>
+            <a:r>
+              <a:rPr lang="es-ES" b="0" dirty="0" err="1">
+                <a:solidFill>
+                  <a:srgbClr val="005C5F"/>
+                </a:solidFill>
+                <a:effectLst/>
+                <a:latin typeface="Consolas" panose="020B0609020204030204" pitchFamily="49" charset="0"/>
+              </a:rPr>
+              <a:t>String</a:t>
+            </a:r>
+            <a:r>
+              <a:rPr lang="es-ES" b="0" dirty="0">
+                <a:solidFill>
+                  <a:srgbClr val="005C5F"/>
+                </a:solidFill>
+                <a:effectLst/>
+                <a:latin typeface="Consolas" panose="020B0609020204030204" pitchFamily="49" charset="0"/>
+              </a:rPr>
+              <a:t>"</a:t>
+            </a:r>
+            <a:r>
+              <a:rPr lang="es-ES" b="0" dirty="0">
+                <a:solidFill>
+                  <a:srgbClr val="4E5B61"/>
+                </a:solidFill>
+                <a:effectLst/>
+                <a:latin typeface="Consolas" panose="020B0609020204030204" pitchFamily="49" charset="0"/>
+              </a:rPr>
+              <a:t>;</a:t>
+            </a:r>
+            <a:r>
+              <a:rPr lang="es-ES" b="0" dirty="0">
+                <a:solidFill>
+                  <a:srgbClr val="95A5A6"/>
+                </a:solidFill>
+                <a:effectLst/>
+                <a:latin typeface="Consolas" panose="020B0609020204030204" pitchFamily="49" charset="0"/>
+              </a:rPr>
+              <a:t> </a:t>
+            </a:r>
+          </a:p>
+          <a:p>
+            <a:pPr>
+              <a:lnSpc>
+                <a:spcPts val="3225"/>
+              </a:lnSpc>
+            </a:pPr>
+            <a:r>
+              <a:rPr lang="es-ES" b="0" dirty="0" err="1">
+                <a:solidFill>
+                  <a:srgbClr val="4E5B61"/>
+                </a:solidFill>
+                <a:effectLst/>
+                <a:latin typeface="Consolas" panose="020B0609020204030204" pitchFamily="49" charset="0"/>
+              </a:rPr>
+              <a:t>String</a:t>
+            </a:r>
+            <a:r>
+              <a:rPr lang="es-ES" b="0" dirty="0">
+                <a:solidFill>
+                  <a:srgbClr val="4E5B61"/>
+                </a:solidFill>
+                <a:effectLst/>
+                <a:latin typeface="Consolas" panose="020B0609020204030204" pitchFamily="49" charset="0"/>
+              </a:rPr>
+              <a:t> </a:t>
+            </a:r>
+            <a:r>
+              <a:rPr lang="es-ES" b="0" dirty="0" err="1">
+                <a:solidFill>
+                  <a:srgbClr val="4E5B61"/>
+                </a:solidFill>
+                <a:effectLst/>
+                <a:latin typeface="Consolas" panose="020B0609020204030204" pitchFamily="49" charset="0"/>
+              </a:rPr>
+              <a:t>stringOne</a:t>
+            </a:r>
+            <a:r>
+              <a:rPr lang="es-ES" b="0" dirty="0">
+                <a:solidFill>
+                  <a:srgbClr val="4E5B61"/>
+                </a:solidFill>
+                <a:effectLst/>
+                <a:latin typeface="Consolas" panose="020B0609020204030204" pitchFamily="49" charset="0"/>
+              </a:rPr>
+              <a:t> = </a:t>
+            </a:r>
+            <a:r>
+              <a:rPr lang="es-ES" b="0" dirty="0" err="1">
+                <a:solidFill>
+                  <a:srgbClr val="D35400"/>
+                </a:solidFill>
+                <a:effectLst/>
+                <a:latin typeface="Consolas" panose="020B0609020204030204" pitchFamily="49" charset="0"/>
+              </a:rPr>
+              <a:t>String</a:t>
+            </a:r>
+            <a:r>
+              <a:rPr lang="es-ES" b="0" dirty="0">
+                <a:solidFill>
+                  <a:srgbClr val="434F54"/>
+                </a:solidFill>
+                <a:effectLst/>
+                <a:latin typeface="Consolas" panose="020B0609020204030204" pitchFamily="49" charset="0"/>
+              </a:rPr>
+              <a:t>(</a:t>
+            </a:r>
+            <a:r>
+              <a:rPr lang="es-ES" b="0" dirty="0">
+                <a:solidFill>
+                  <a:srgbClr val="4E5B61"/>
+                </a:solidFill>
+                <a:effectLst/>
+                <a:latin typeface="Consolas" panose="020B0609020204030204" pitchFamily="49" charset="0"/>
+              </a:rPr>
+              <a:t>'a’</a:t>
+            </a:r>
+            <a:r>
+              <a:rPr lang="es-ES" b="0" dirty="0">
+                <a:solidFill>
+                  <a:srgbClr val="434F54"/>
+                </a:solidFill>
+                <a:effectLst/>
+                <a:latin typeface="Consolas" panose="020B0609020204030204" pitchFamily="49" charset="0"/>
+              </a:rPr>
+              <a:t>)</a:t>
+            </a:r>
+            <a:r>
+              <a:rPr lang="es-ES" b="0" dirty="0">
+                <a:solidFill>
+                  <a:srgbClr val="4E5B61"/>
+                </a:solidFill>
+                <a:effectLst/>
+                <a:latin typeface="Consolas" panose="020B0609020204030204" pitchFamily="49" charset="0"/>
+              </a:rPr>
+              <a:t>;</a:t>
+            </a:r>
+            <a:endParaRPr lang="es-ES" dirty="0">
+              <a:solidFill>
+                <a:srgbClr val="95A5A6"/>
+              </a:solidFill>
+              <a:latin typeface="Consolas" panose="020B0609020204030204" pitchFamily="49" charset="0"/>
+            </a:endParaRPr>
+          </a:p>
+          <a:p>
+            <a:pPr>
+              <a:lnSpc>
+                <a:spcPts val="3225"/>
+              </a:lnSpc>
+            </a:pPr>
+            <a:r>
+              <a:rPr lang="es-ES" b="0" dirty="0" err="1">
+                <a:solidFill>
+                  <a:srgbClr val="4E5B61"/>
+                </a:solidFill>
+                <a:effectLst/>
+                <a:latin typeface="Consolas" panose="020B0609020204030204" pitchFamily="49" charset="0"/>
+              </a:rPr>
+              <a:t>String</a:t>
+            </a:r>
+            <a:r>
+              <a:rPr lang="es-ES" b="0" dirty="0">
+                <a:solidFill>
+                  <a:srgbClr val="4E5B61"/>
+                </a:solidFill>
+                <a:effectLst/>
+                <a:latin typeface="Consolas" panose="020B0609020204030204" pitchFamily="49" charset="0"/>
+              </a:rPr>
+              <a:t> </a:t>
+            </a:r>
+            <a:r>
+              <a:rPr lang="es-ES" b="0" dirty="0" err="1">
+                <a:solidFill>
+                  <a:srgbClr val="4E5B61"/>
+                </a:solidFill>
+                <a:effectLst/>
+                <a:latin typeface="Consolas" panose="020B0609020204030204" pitchFamily="49" charset="0"/>
+              </a:rPr>
+              <a:t>stringTwo</a:t>
+            </a:r>
+            <a:r>
+              <a:rPr lang="es-ES" b="0" dirty="0">
+                <a:solidFill>
+                  <a:srgbClr val="4E5B61"/>
+                </a:solidFill>
+                <a:effectLst/>
+                <a:latin typeface="Consolas" panose="020B0609020204030204" pitchFamily="49" charset="0"/>
+              </a:rPr>
+              <a:t> = </a:t>
+            </a:r>
+            <a:r>
+              <a:rPr lang="es-ES" b="0" dirty="0" err="1">
+                <a:solidFill>
+                  <a:srgbClr val="D35400"/>
+                </a:solidFill>
+                <a:effectLst/>
+                <a:latin typeface="Consolas" panose="020B0609020204030204" pitchFamily="49" charset="0"/>
+              </a:rPr>
+              <a:t>String</a:t>
+            </a:r>
+            <a:r>
+              <a:rPr lang="es-ES" b="0" dirty="0">
+                <a:solidFill>
+                  <a:srgbClr val="434F54"/>
+                </a:solidFill>
+                <a:effectLst/>
+                <a:latin typeface="Consolas" panose="020B0609020204030204" pitchFamily="49" charset="0"/>
+              </a:rPr>
+              <a:t>(</a:t>
+            </a:r>
+            <a:r>
+              <a:rPr lang="es-ES" b="0" dirty="0">
+                <a:solidFill>
+                  <a:srgbClr val="005C5F"/>
+                </a:solidFill>
+                <a:effectLst/>
+                <a:latin typeface="Consolas" panose="020B0609020204030204" pitchFamily="49" charset="0"/>
+              </a:rPr>
+              <a:t>"</a:t>
+            </a:r>
+            <a:r>
+              <a:rPr lang="es-ES" b="0" dirty="0" err="1">
+                <a:solidFill>
+                  <a:srgbClr val="005C5F"/>
+                </a:solidFill>
+                <a:effectLst/>
+                <a:latin typeface="Consolas" panose="020B0609020204030204" pitchFamily="49" charset="0"/>
+              </a:rPr>
+              <a:t>This</a:t>
+            </a:r>
+            <a:r>
+              <a:rPr lang="es-ES" b="0" dirty="0">
+                <a:solidFill>
+                  <a:srgbClr val="005C5F"/>
+                </a:solidFill>
+                <a:effectLst/>
+                <a:latin typeface="Consolas" panose="020B0609020204030204" pitchFamily="49" charset="0"/>
+              </a:rPr>
+              <a:t> </a:t>
+            </a:r>
+            <a:r>
+              <a:rPr lang="es-ES" b="0" dirty="0" err="1">
+                <a:solidFill>
+                  <a:srgbClr val="005C5F"/>
+                </a:solidFill>
+                <a:effectLst/>
+                <a:latin typeface="Consolas" panose="020B0609020204030204" pitchFamily="49" charset="0"/>
+              </a:rPr>
+              <a:t>is</a:t>
+            </a:r>
+            <a:r>
+              <a:rPr lang="es-ES" b="0" dirty="0">
+                <a:solidFill>
+                  <a:srgbClr val="005C5F"/>
+                </a:solidFill>
+                <a:effectLst/>
+                <a:latin typeface="Consolas" panose="020B0609020204030204" pitchFamily="49" charset="0"/>
+              </a:rPr>
+              <a:t> a </a:t>
+            </a:r>
+            <a:r>
+              <a:rPr lang="es-ES" b="0" dirty="0" err="1">
+                <a:solidFill>
+                  <a:srgbClr val="005C5F"/>
+                </a:solidFill>
+                <a:effectLst/>
+                <a:latin typeface="Consolas" panose="020B0609020204030204" pitchFamily="49" charset="0"/>
+              </a:rPr>
+              <a:t>string</a:t>
+            </a:r>
+            <a:r>
+              <a:rPr lang="es-ES" b="0" dirty="0">
+                <a:solidFill>
+                  <a:srgbClr val="005C5F"/>
+                </a:solidFill>
+                <a:effectLst/>
+                <a:latin typeface="Consolas" panose="020B0609020204030204" pitchFamily="49" charset="0"/>
+              </a:rPr>
+              <a:t>"</a:t>
+            </a:r>
+            <a:r>
+              <a:rPr lang="es-ES" b="0" dirty="0">
+                <a:solidFill>
+                  <a:srgbClr val="434F54"/>
+                </a:solidFill>
+                <a:effectLst/>
+                <a:latin typeface="Consolas" panose="020B0609020204030204" pitchFamily="49" charset="0"/>
+              </a:rPr>
+              <a:t>)</a:t>
+            </a:r>
+            <a:r>
+              <a:rPr lang="es-ES" b="0" dirty="0">
+                <a:solidFill>
+                  <a:srgbClr val="4E5B61"/>
+                </a:solidFill>
+                <a:effectLst/>
+                <a:latin typeface="Consolas" panose="020B0609020204030204" pitchFamily="49" charset="0"/>
+              </a:rPr>
+              <a:t>;</a:t>
+            </a:r>
+          </a:p>
+          <a:p>
+            <a:pPr>
+              <a:lnSpc>
+                <a:spcPts val="3225"/>
+              </a:lnSpc>
+            </a:pPr>
+            <a:r>
+              <a:rPr lang="es-ES" b="0" dirty="0" err="1">
+                <a:solidFill>
+                  <a:srgbClr val="4E5B61"/>
+                </a:solidFill>
+                <a:effectLst/>
+                <a:latin typeface="Consolas" panose="020B0609020204030204" pitchFamily="49" charset="0"/>
+              </a:rPr>
+              <a:t>String</a:t>
+            </a:r>
+            <a:r>
+              <a:rPr lang="es-ES" b="0" dirty="0">
+                <a:solidFill>
+                  <a:srgbClr val="4E5B61"/>
+                </a:solidFill>
+                <a:effectLst/>
+                <a:latin typeface="Consolas" panose="020B0609020204030204" pitchFamily="49" charset="0"/>
+              </a:rPr>
+              <a:t> </a:t>
+            </a:r>
+            <a:r>
+              <a:rPr lang="es-ES" b="0" dirty="0" err="1">
+                <a:solidFill>
+                  <a:srgbClr val="4E5B61"/>
+                </a:solidFill>
+                <a:effectLst/>
+                <a:latin typeface="Consolas" panose="020B0609020204030204" pitchFamily="49" charset="0"/>
+              </a:rPr>
+              <a:t>stringOne</a:t>
+            </a:r>
+            <a:r>
+              <a:rPr lang="es-ES" b="0" dirty="0">
+                <a:solidFill>
+                  <a:srgbClr val="4E5B61"/>
+                </a:solidFill>
+                <a:effectLst/>
+                <a:latin typeface="Consolas" panose="020B0609020204030204" pitchFamily="49" charset="0"/>
+              </a:rPr>
+              <a:t> = </a:t>
+            </a:r>
+            <a:r>
+              <a:rPr lang="es-ES" b="0" dirty="0" err="1">
+                <a:solidFill>
+                  <a:srgbClr val="D35400"/>
+                </a:solidFill>
+                <a:effectLst/>
+                <a:latin typeface="Consolas" panose="020B0609020204030204" pitchFamily="49" charset="0"/>
+              </a:rPr>
+              <a:t>String</a:t>
+            </a:r>
+            <a:r>
+              <a:rPr lang="es-ES" b="0" dirty="0">
+                <a:solidFill>
+                  <a:srgbClr val="434F54"/>
+                </a:solidFill>
+                <a:effectLst/>
+                <a:latin typeface="Consolas" panose="020B0609020204030204" pitchFamily="49" charset="0"/>
+              </a:rPr>
+              <a:t>(</a:t>
+            </a:r>
+            <a:r>
+              <a:rPr lang="es-ES" b="0" dirty="0" err="1">
+                <a:solidFill>
+                  <a:srgbClr val="4E5B61"/>
+                </a:solidFill>
+                <a:effectLst/>
+                <a:latin typeface="Consolas" panose="020B0609020204030204" pitchFamily="49" charset="0"/>
+              </a:rPr>
+              <a:t>stringTwo</a:t>
+            </a:r>
+            <a:r>
+              <a:rPr lang="es-ES" b="0" dirty="0">
+                <a:solidFill>
+                  <a:srgbClr val="4E5B61"/>
+                </a:solidFill>
+                <a:effectLst/>
+                <a:latin typeface="Consolas" panose="020B0609020204030204" pitchFamily="49" charset="0"/>
+              </a:rPr>
+              <a:t> + </a:t>
+            </a:r>
+            <a:r>
+              <a:rPr lang="es-ES" b="0" dirty="0">
+                <a:solidFill>
+                  <a:srgbClr val="005C5F"/>
+                </a:solidFill>
+                <a:effectLst/>
+                <a:latin typeface="Consolas" panose="020B0609020204030204" pitchFamily="49" charset="0"/>
+              </a:rPr>
+              <a:t>" </a:t>
+            </a:r>
+            <a:r>
+              <a:rPr lang="es-ES" b="0" dirty="0" err="1">
+                <a:solidFill>
+                  <a:srgbClr val="005C5F"/>
+                </a:solidFill>
+                <a:effectLst/>
+                <a:latin typeface="Consolas" panose="020B0609020204030204" pitchFamily="49" charset="0"/>
+              </a:rPr>
+              <a:t>with</a:t>
+            </a:r>
+            <a:r>
+              <a:rPr lang="es-ES" b="0" dirty="0">
+                <a:solidFill>
+                  <a:srgbClr val="005C5F"/>
+                </a:solidFill>
+                <a:effectLst/>
+                <a:latin typeface="Consolas" panose="020B0609020204030204" pitchFamily="49" charset="0"/>
+              </a:rPr>
+              <a:t> more"</a:t>
+            </a:r>
+            <a:r>
+              <a:rPr lang="es-ES" b="0" dirty="0">
+                <a:solidFill>
+                  <a:srgbClr val="434F54"/>
+                </a:solidFill>
+                <a:effectLst/>
+                <a:latin typeface="Consolas" panose="020B0609020204030204" pitchFamily="49" charset="0"/>
+              </a:rPr>
+              <a:t>)</a:t>
+            </a:r>
+            <a:r>
+              <a:rPr lang="es-ES" b="0" dirty="0">
+                <a:solidFill>
+                  <a:srgbClr val="4E5B61"/>
+                </a:solidFill>
+                <a:effectLst/>
+                <a:latin typeface="Consolas" panose="020B0609020204030204" pitchFamily="49" charset="0"/>
+              </a:rPr>
+              <a:t>;</a:t>
+            </a:r>
+            <a:r>
+              <a:rPr lang="es-ES" b="0" dirty="0">
+                <a:solidFill>
+                  <a:srgbClr val="95A5A6"/>
+                </a:solidFill>
+                <a:effectLst/>
+                <a:latin typeface="Consolas" panose="020B0609020204030204" pitchFamily="49" charset="0"/>
+              </a:rPr>
+              <a:t>  </a:t>
+            </a:r>
+            <a:endParaRPr lang="es-ES" b="0" dirty="0">
+              <a:solidFill>
+                <a:srgbClr val="4E5B61"/>
+              </a:solidFill>
+              <a:effectLst/>
+              <a:latin typeface="Consolas" panose="020B0609020204030204" pitchFamily="49" charset="0"/>
+            </a:endParaRPr>
+          </a:p>
+          <a:p>
+            <a:pPr>
+              <a:lnSpc>
+                <a:spcPts val="3225"/>
+              </a:lnSpc>
+            </a:pPr>
+            <a:r>
+              <a:rPr lang="es-ES" b="0" dirty="0" err="1">
+                <a:solidFill>
+                  <a:srgbClr val="4E5B61"/>
+                </a:solidFill>
+                <a:effectLst/>
+                <a:latin typeface="Consolas" panose="020B0609020204030204" pitchFamily="49" charset="0"/>
+              </a:rPr>
+              <a:t>String</a:t>
+            </a:r>
+            <a:r>
+              <a:rPr lang="es-ES" b="0" dirty="0">
+                <a:solidFill>
+                  <a:srgbClr val="4E5B61"/>
+                </a:solidFill>
+                <a:effectLst/>
+                <a:latin typeface="Consolas" panose="020B0609020204030204" pitchFamily="49" charset="0"/>
+              </a:rPr>
+              <a:t> </a:t>
+            </a:r>
+            <a:r>
+              <a:rPr lang="es-ES" b="0" dirty="0" err="1">
+                <a:solidFill>
+                  <a:srgbClr val="4E5B61"/>
+                </a:solidFill>
+                <a:effectLst/>
+                <a:latin typeface="Consolas" panose="020B0609020204030204" pitchFamily="49" charset="0"/>
+              </a:rPr>
+              <a:t>stringOne</a:t>
+            </a:r>
+            <a:r>
+              <a:rPr lang="es-ES" b="0" dirty="0">
+                <a:solidFill>
+                  <a:srgbClr val="4E5B61"/>
+                </a:solidFill>
+                <a:effectLst/>
+                <a:latin typeface="Consolas" panose="020B0609020204030204" pitchFamily="49" charset="0"/>
+              </a:rPr>
+              <a:t> = </a:t>
+            </a:r>
+            <a:r>
+              <a:rPr lang="es-ES" b="0" dirty="0" err="1">
+                <a:solidFill>
+                  <a:srgbClr val="D35400"/>
+                </a:solidFill>
+                <a:effectLst/>
+                <a:latin typeface="Consolas" panose="020B0609020204030204" pitchFamily="49" charset="0"/>
+              </a:rPr>
+              <a:t>String</a:t>
+            </a:r>
+            <a:r>
+              <a:rPr lang="es-ES" b="0" dirty="0">
+                <a:solidFill>
+                  <a:srgbClr val="434F54"/>
+                </a:solidFill>
+                <a:effectLst/>
+                <a:latin typeface="Consolas" panose="020B0609020204030204" pitchFamily="49" charset="0"/>
+              </a:rPr>
+              <a:t>(</a:t>
+            </a:r>
+            <a:r>
+              <a:rPr lang="es-ES" b="0" dirty="0">
+                <a:solidFill>
+                  <a:srgbClr val="005C5F"/>
+                </a:solidFill>
+                <a:effectLst/>
+                <a:latin typeface="Consolas" panose="020B0609020204030204" pitchFamily="49" charset="0"/>
+              </a:rPr>
+              <a:t>13</a:t>
+            </a:r>
+            <a:r>
+              <a:rPr lang="es-ES" b="0" dirty="0">
+                <a:solidFill>
+                  <a:srgbClr val="434F54"/>
+                </a:solidFill>
+                <a:effectLst/>
+                <a:latin typeface="Consolas" panose="020B0609020204030204" pitchFamily="49" charset="0"/>
+              </a:rPr>
+              <a:t>)</a:t>
+            </a:r>
+            <a:r>
+              <a:rPr lang="es-ES" b="0" dirty="0">
+                <a:solidFill>
+                  <a:srgbClr val="4E5B61"/>
+                </a:solidFill>
+                <a:effectLst/>
+                <a:latin typeface="Consolas" panose="020B0609020204030204" pitchFamily="49" charset="0"/>
+              </a:rPr>
+              <a:t>;</a:t>
+            </a:r>
+            <a:r>
+              <a:rPr lang="es-ES" b="0" dirty="0">
+                <a:solidFill>
+                  <a:srgbClr val="95A5A6"/>
+                </a:solidFill>
+                <a:effectLst/>
+                <a:latin typeface="Consolas" panose="020B0609020204030204" pitchFamily="49" charset="0"/>
+              </a:rPr>
+              <a:t>                      </a:t>
+            </a:r>
+            <a:endParaRPr lang="es-ES" b="0" dirty="0">
+              <a:solidFill>
+                <a:srgbClr val="4E5B61"/>
+              </a:solidFill>
+              <a:effectLst/>
+              <a:latin typeface="Consolas" panose="020B0609020204030204" pitchFamily="49" charset="0"/>
+            </a:endParaRPr>
+          </a:p>
+          <a:p>
+            <a:pPr>
+              <a:lnSpc>
+                <a:spcPts val="3225"/>
+              </a:lnSpc>
+            </a:pPr>
+            <a:r>
+              <a:rPr lang="es-ES" b="0" dirty="0" err="1">
+                <a:solidFill>
+                  <a:srgbClr val="4E5B61"/>
+                </a:solidFill>
+                <a:effectLst/>
+                <a:latin typeface="Consolas" panose="020B0609020204030204" pitchFamily="49" charset="0"/>
+              </a:rPr>
+              <a:t>String</a:t>
+            </a:r>
+            <a:r>
+              <a:rPr lang="es-ES" b="0" dirty="0">
+                <a:solidFill>
+                  <a:srgbClr val="4E5B61"/>
+                </a:solidFill>
+                <a:effectLst/>
+                <a:latin typeface="Consolas" panose="020B0609020204030204" pitchFamily="49" charset="0"/>
+              </a:rPr>
+              <a:t> </a:t>
+            </a:r>
+            <a:r>
+              <a:rPr lang="es-ES" b="0" dirty="0" err="1">
+                <a:solidFill>
+                  <a:srgbClr val="4E5B61"/>
+                </a:solidFill>
+                <a:effectLst/>
+                <a:latin typeface="Consolas" panose="020B0609020204030204" pitchFamily="49" charset="0"/>
+              </a:rPr>
+              <a:t>stringOne</a:t>
+            </a:r>
+            <a:r>
+              <a:rPr lang="es-ES" b="0" dirty="0">
+                <a:solidFill>
+                  <a:srgbClr val="4E5B61"/>
+                </a:solidFill>
+                <a:effectLst/>
+                <a:latin typeface="Consolas" panose="020B0609020204030204" pitchFamily="49" charset="0"/>
+              </a:rPr>
+              <a:t> = </a:t>
+            </a:r>
+            <a:r>
+              <a:rPr lang="es-ES" b="0" dirty="0" err="1">
+                <a:solidFill>
+                  <a:srgbClr val="D35400"/>
+                </a:solidFill>
+                <a:effectLst/>
+                <a:latin typeface="Consolas" panose="020B0609020204030204" pitchFamily="49" charset="0"/>
+              </a:rPr>
+              <a:t>String</a:t>
+            </a:r>
+            <a:r>
+              <a:rPr lang="es-ES" b="0" dirty="0">
+                <a:solidFill>
+                  <a:srgbClr val="434F54"/>
+                </a:solidFill>
+                <a:effectLst/>
+                <a:latin typeface="Consolas" panose="020B0609020204030204" pitchFamily="49" charset="0"/>
+              </a:rPr>
+              <a:t>(</a:t>
+            </a:r>
+            <a:r>
+              <a:rPr lang="es-ES" b="0" dirty="0">
+                <a:solidFill>
+                  <a:srgbClr val="005C5F"/>
+                </a:solidFill>
+                <a:effectLst/>
+                <a:latin typeface="Consolas" panose="020B0609020204030204" pitchFamily="49" charset="0"/>
+              </a:rPr>
+              <a:t>45</a:t>
+            </a:r>
+            <a:r>
+              <a:rPr lang="es-ES" b="0" dirty="0">
+                <a:solidFill>
+                  <a:srgbClr val="4E5B61"/>
+                </a:solidFill>
+                <a:effectLst/>
+                <a:latin typeface="Consolas" panose="020B0609020204030204" pitchFamily="49" charset="0"/>
+              </a:rPr>
+              <a:t>, HEX</a:t>
+            </a:r>
+            <a:r>
+              <a:rPr lang="es-ES" b="0" dirty="0">
+                <a:solidFill>
+                  <a:srgbClr val="434F54"/>
+                </a:solidFill>
+                <a:effectLst/>
+                <a:latin typeface="Consolas" panose="020B0609020204030204" pitchFamily="49" charset="0"/>
+              </a:rPr>
+              <a:t>)</a:t>
+            </a:r>
+            <a:r>
+              <a:rPr lang="es-ES" b="0" dirty="0">
+                <a:solidFill>
+                  <a:srgbClr val="4E5B61"/>
+                </a:solidFill>
+                <a:effectLst/>
+                <a:latin typeface="Consolas" panose="020B0609020204030204" pitchFamily="49" charset="0"/>
+              </a:rPr>
+              <a:t>;</a:t>
+            </a:r>
+            <a:r>
+              <a:rPr lang="es-ES" b="0" dirty="0">
+                <a:solidFill>
+                  <a:srgbClr val="95A5A6"/>
+                </a:solidFill>
+                <a:effectLst/>
+                <a:latin typeface="Consolas" panose="020B0609020204030204" pitchFamily="49" charset="0"/>
+              </a:rPr>
+              <a:t>                  </a:t>
+            </a:r>
+            <a:endParaRPr lang="es-ES" b="0" dirty="0">
+              <a:solidFill>
+                <a:srgbClr val="4E5B61"/>
+              </a:solidFill>
+              <a:effectLst/>
+              <a:latin typeface="Consolas" panose="020B0609020204030204" pitchFamily="49" charset="0"/>
+            </a:endParaRPr>
+          </a:p>
+          <a:p>
+            <a:pPr>
+              <a:lnSpc>
+                <a:spcPts val="3225"/>
+              </a:lnSpc>
+            </a:pPr>
+            <a:r>
+              <a:rPr lang="es-ES" b="0" dirty="0" err="1">
+                <a:solidFill>
+                  <a:srgbClr val="4E5B61"/>
+                </a:solidFill>
+                <a:effectLst/>
+                <a:latin typeface="Consolas" panose="020B0609020204030204" pitchFamily="49" charset="0"/>
+              </a:rPr>
+              <a:t>String</a:t>
+            </a:r>
+            <a:r>
+              <a:rPr lang="es-ES" b="0" dirty="0">
+                <a:solidFill>
+                  <a:srgbClr val="4E5B61"/>
+                </a:solidFill>
+                <a:effectLst/>
+                <a:latin typeface="Consolas" panose="020B0609020204030204" pitchFamily="49" charset="0"/>
+              </a:rPr>
+              <a:t> </a:t>
+            </a:r>
+            <a:r>
+              <a:rPr lang="es-ES" b="0" dirty="0" err="1">
+                <a:solidFill>
+                  <a:srgbClr val="4E5B61"/>
+                </a:solidFill>
+                <a:effectLst/>
+                <a:latin typeface="Consolas" panose="020B0609020204030204" pitchFamily="49" charset="0"/>
+              </a:rPr>
+              <a:t>stringOne</a:t>
+            </a:r>
+            <a:r>
+              <a:rPr lang="es-ES" b="0" dirty="0">
+                <a:solidFill>
+                  <a:srgbClr val="4E5B61"/>
+                </a:solidFill>
+                <a:effectLst/>
+                <a:latin typeface="Consolas" panose="020B0609020204030204" pitchFamily="49" charset="0"/>
+              </a:rPr>
+              <a:t> = </a:t>
+            </a:r>
+            <a:r>
+              <a:rPr lang="es-ES" b="0" dirty="0" err="1">
+                <a:solidFill>
+                  <a:srgbClr val="D35400"/>
+                </a:solidFill>
+                <a:effectLst/>
+                <a:latin typeface="Consolas" panose="020B0609020204030204" pitchFamily="49" charset="0"/>
+              </a:rPr>
+              <a:t>String</a:t>
+            </a:r>
+            <a:r>
+              <a:rPr lang="es-ES" b="0" dirty="0">
+                <a:solidFill>
+                  <a:srgbClr val="434F54"/>
+                </a:solidFill>
+                <a:effectLst/>
+                <a:latin typeface="Consolas" panose="020B0609020204030204" pitchFamily="49" charset="0"/>
+              </a:rPr>
+              <a:t>(</a:t>
+            </a:r>
+            <a:r>
+              <a:rPr lang="es-ES" b="0" dirty="0">
+                <a:solidFill>
+                  <a:srgbClr val="005C5F"/>
+                </a:solidFill>
+                <a:effectLst/>
+                <a:latin typeface="Consolas" panose="020B0609020204030204" pitchFamily="49" charset="0"/>
+              </a:rPr>
+              <a:t>255</a:t>
+            </a:r>
+            <a:r>
+              <a:rPr lang="es-ES" b="0" dirty="0">
+                <a:solidFill>
+                  <a:srgbClr val="4E5B61"/>
+                </a:solidFill>
+                <a:effectLst/>
+                <a:latin typeface="Consolas" panose="020B0609020204030204" pitchFamily="49" charset="0"/>
+              </a:rPr>
+              <a:t>, BIN</a:t>
+            </a:r>
+            <a:r>
+              <a:rPr lang="es-ES" b="0" dirty="0">
+                <a:solidFill>
+                  <a:srgbClr val="434F54"/>
+                </a:solidFill>
+                <a:effectLst/>
+                <a:latin typeface="Consolas" panose="020B0609020204030204" pitchFamily="49" charset="0"/>
+              </a:rPr>
+              <a:t>)</a:t>
+            </a:r>
+            <a:r>
+              <a:rPr lang="es-ES" b="0" dirty="0">
+                <a:solidFill>
+                  <a:srgbClr val="4E5B61"/>
+                </a:solidFill>
+                <a:effectLst/>
+                <a:latin typeface="Consolas" panose="020B0609020204030204" pitchFamily="49" charset="0"/>
+              </a:rPr>
+              <a:t>;</a:t>
+            </a:r>
+            <a:r>
+              <a:rPr lang="es-ES" b="0" dirty="0">
+                <a:solidFill>
+                  <a:srgbClr val="95A5A6"/>
+                </a:solidFill>
+                <a:effectLst/>
+                <a:latin typeface="Consolas" panose="020B0609020204030204" pitchFamily="49" charset="0"/>
+              </a:rPr>
+              <a:t>                          </a:t>
+            </a:r>
+            <a:endParaRPr lang="es-ES" b="0" dirty="0">
+              <a:solidFill>
+                <a:srgbClr val="4E5B61"/>
+              </a:solidFill>
+              <a:effectLst/>
+              <a:latin typeface="Consolas" panose="020B0609020204030204" pitchFamily="49" charset="0"/>
+            </a:endParaRPr>
+          </a:p>
+          <a:p>
+            <a:pPr>
+              <a:lnSpc>
+                <a:spcPts val="3225"/>
+              </a:lnSpc>
+            </a:pPr>
+            <a:r>
+              <a:rPr lang="es-ES" b="0" dirty="0" err="1">
+                <a:solidFill>
+                  <a:srgbClr val="4E5B61"/>
+                </a:solidFill>
+                <a:effectLst/>
+                <a:latin typeface="Consolas" panose="020B0609020204030204" pitchFamily="49" charset="0"/>
+              </a:rPr>
+              <a:t>String</a:t>
+            </a:r>
+            <a:r>
+              <a:rPr lang="es-ES" b="0" dirty="0">
+                <a:solidFill>
+                  <a:srgbClr val="4E5B61"/>
+                </a:solidFill>
+                <a:effectLst/>
+                <a:latin typeface="Consolas" panose="020B0609020204030204" pitchFamily="49" charset="0"/>
+              </a:rPr>
+              <a:t> </a:t>
+            </a:r>
+            <a:r>
+              <a:rPr lang="es-ES" b="0" dirty="0" err="1">
+                <a:solidFill>
+                  <a:srgbClr val="4E5B61"/>
+                </a:solidFill>
+                <a:effectLst/>
+                <a:latin typeface="Consolas" panose="020B0609020204030204" pitchFamily="49" charset="0"/>
+              </a:rPr>
+              <a:t>stringOne</a:t>
+            </a:r>
+            <a:r>
+              <a:rPr lang="es-ES" b="0" dirty="0">
+                <a:solidFill>
+                  <a:srgbClr val="4E5B61"/>
+                </a:solidFill>
+                <a:effectLst/>
+                <a:latin typeface="Consolas" panose="020B0609020204030204" pitchFamily="49" charset="0"/>
+              </a:rPr>
+              <a:t> = </a:t>
+            </a:r>
+            <a:r>
+              <a:rPr lang="es-ES" b="0" dirty="0" err="1">
+                <a:solidFill>
+                  <a:srgbClr val="D35400"/>
+                </a:solidFill>
+                <a:effectLst/>
+                <a:latin typeface="Consolas" panose="020B0609020204030204" pitchFamily="49" charset="0"/>
+              </a:rPr>
+              <a:t>String</a:t>
+            </a:r>
+            <a:r>
+              <a:rPr lang="es-ES" b="0" dirty="0">
+                <a:solidFill>
+                  <a:srgbClr val="434F54"/>
+                </a:solidFill>
+                <a:effectLst/>
+                <a:latin typeface="Consolas" panose="020B0609020204030204" pitchFamily="49" charset="0"/>
+              </a:rPr>
+              <a:t>(</a:t>
+            </a:r>
+            <a:r>
+              <a:rPr lang="es-ES" b="0" dirty="0">
+                <a:solidFill>
+                  <a:srgbClr val="005C5F"/>
+                </a:solidFill>
+                <a:effectLst/>
+                <a:latin typeface="Consolas" panose="020B0609020204030204" pitchFamily="49" charset="0"/>
+              </a:rPr>
+              <a:t>5.698</a:t>
+            </a:r>
+            <a:r>
+              <a:rPr lang="es-ES" b="0" dirty="0">
+                <a:solidFill>
+                  <a:srgbClr val="4E5B61"/>
+                </a:solidFill>
+                <a:effectLst/>
+                <a:latin typeface="Consolas" panose="020B0609020204030204" pitchFamily="49" charset="0"/>
+              </a:rPr>
+              <a:t>, </a:t>
+            </a:r>
+            <a:r>
+              <a:rPr lang="es-ES" b="0" dirty="0">
+                <a:solidFill>
+                  <a:srgbClr val="005C5F"/>
+                </a:solidFill>
+                <a:effectLst/>
+                <a:latin typeface="Consolas" panose="020B0609020204030204" pitchFamily="49" charset="0"/>
+              </a:rPr>
+              <a:t>3</a:t>
+            </a:r>
+            <a:r>
+              <a:rPr lang="es-ES" b="0" dirty="0">
+                <a:solidFill>
+                  <a:srgbClr val="434F54"/>
+                </a:solidFill>
+                <a:effectLst/>
+                <a:latin typeface="Consolas" panose="020B0609020204030204" pitchFamily="49" charset="0"/>
+              </a:rPr>
+              <a:t>)</a:t>
+            </a:r>
+            <a:r>
+              <a:rPr lang="es-ES" b="0" dirty="0">
+                <a:solidFill>
+                  <a:srgbClr val="4E5B61"/>
+                </a:solidFill>
+                <a:effectLst/>
+                <a:latin typeface="Consolas" panose="020B0609020204030204" pitchFamily="49" charset="0"/>
+              </a:rPr>
+              <a:t>;</a:t>
+            </a:r>
+          </a:p>
+        </p:txBody>
+      </p:sp>
+    </p:spTree>
+    <p:extLst>
+      <p:ext uri="{BB962C8B-B14F-4D97-AF65-F5344CB8AC3E}">
+        <p14:creationId xmlns:p14="http://schemas.microsoft.com/office/powerpoint/2010/main" val="329847634"/>
+      </p:ext>
+    </p:extLst>
+  </p:cSld>
+  <p:clrMapOvr>
+    <a:masterClrMapping/>
+  </p:clrMapOvr>
+</p:sld>
+</file>
+
+<file path=ppt/slides/slide22.xml><?xml version="1.0" encoding="utf-8"?>
 <p:sld xmlns:a="http://schemas.openxmlformats.org/drawingml/2006/main" xmlns:r="http://schemas.openxmlformats.org/officeDocument/2006/relationships" xmlns:p="http://schemas.openxmlformats.org/presentationml/2006/main">
   <p:cSld>
     <p:spTree>

</xml_diff>